<commit_message>
Added new model (SQRshadow)
</commit_message>
<xml_diff>
--- a/CobacobaModelIstilahBaru.pptx
+++ b/CobacobaModelIstilahBaru.pptx
@@ -8,11 +8,12 @@
     <p:sldId id="265" r:id="rId2"/>
     <p:sldId id="263" r:id="rId3"/>
     <p:sldId id="266" r:id="rId4"/>
-    <p:sldId id="257" r:id="rId5"/>
-    <p:sldId id="260" r:id="rId6"/>
-    <p:sldId id="261" r:id="rId7"/>
-    <p:sldId id="259" r:id="rId8"/>
-    <p:sldId id="262" r:id="rId9"/>
+    <p:sldId id="267" r:id="rId5"/>
+    <p:sldId id="257" r:id="rId6"/>
+    <p:sldId id="260" r:id="rId7"/>
+    <p:sldId id="261" r:id="rId8"/>
+    <p:sldId id="259" r:id="rId9"/>
+    <p:sldId id="262" r:id="rId10"/>
   </p:sldIdLst>
   <p:sldSz cx="12192000" cy="6858000"/>
   <p:notesSz cx="6858000" cy="9144000"/>
@@ -250,7 +251,7 @@
           <a:p>
             <a:fld id="{2CB84BBD-8394-4C49-A765-E0B955FBE0CA}" type="datetimeFigureOut">
               <a:rPr lang="id-ID" smtClean="0"/>
-              <a:t>16/09/2020</a:t>
+              <a:t>19/09/2020</a:t>
             </a:fld>
             <a:endParaRPr lang="id-ID"/>
           </a:p>
@@ -420,7 +421,7 @@
           <a:p>
             <a:fld id="{2CB84BBD-8394-4C49-A765-E0B955FBE0CA}" type="datetimeFigureOut">
               <a:rPr lang="id-ID" smtClean="0"/>
-              <a:t>16/09/2020</a:t>
+              <a:t>19/09/2020</a:t>
             </a:fld>
             <a:endParaRPr lang="id-ID"/>
           </a:p>
@@ -600,7 +601,7 @@
           <a:p>
             <a:fld id="{2CB84BBD-8394-4C49-A765-E0B955FBE0CA}" type="datetimeFigureOut">
               <a:rPr lang="id-ID" smtClean="0"/>
-              <a:t>16/09/2020</a:t>
+              <a:t>19/09/2020</a:t>
             </a:fld>
             <a:endParaRPr lang="id-ID"/>
           </a:p>
@@ -770,7 +771,7 @@
           <a:p>
             <a:fld id="{2CB84BBD-8394-4C49-A765-E0B955FBE0CA}" type="datetimeFigureOut">
               <a:rPr lang="id-ID" smtClean="0"/>
-              <a:t>16/09/2020</a:t>
+              <a:t>19/09/2020</a:t>
             </a:fld>
             <a:endParaRPr lang="id-ID"/>
           </a:p>
@@ -1016,7 +1017,7 @@
           <a:p>
             <a:fld id="{2CB84BBD-8394-4C49-A765-E0B955FBE0CA}" type="datetimeFigureOut">
               <a:rPr lang="id-ID" smtClean="0"/>
-              <a:t>16/09/2020</a:t>
+              <a:t>19/09/2020</a:t>
             </a:fld>
             <a:endParaRPr lang="id-ID"/>
           </a:p>
@@ -1248,7 +1249,7 @@
           <a:p>
             <a:fld id="{2CB84BBD-8394-4C49-A765-E0B955FBE0CA}" type="datetimeFigureOut">
               <a:rPr lang="id-ID" smtClean="0"/>
-              <a:t>16/09/2020</a:t>
+              <a:t>19/09/2020</a:t>
             </a:fld>
             <a:endParaRPr lang="id-ID"/>
           </a:p>
@@ -1615,7 +1616,7 @@
           <a:p>
             <a:fld id="{2CB84BBD-8394-4C49-A765-E0B955FBE0CA}" type="datetimeFigureOut">
               <a:rPr lang="id-ID" smtClean="0"/>
-              <a:t>16/09/2020</a:t>
+              <a:t>19/09/2020</a:t>
             </a:fld>
             <a:endParaRPr lang="id-ID"/>
           </a:p>
@@ -1733,7 +1734,7 @@
           <a:p>
             <a:fld id="{2CB84BBD-8394-4C49-A765-E0B955FBE0CA}" type="datetimeFigureOut">
               <a:rPr lang="id-ID" smtClean="0"/>
-              <a:t>16/09/2020</a:t>
+              <a:t>19/09/2020</a:t>
             </a:fld>
             <a:endParaRPr lang="id-ID"/>
           </a:p>
@@ -1828,7 +1829,7 @@
           <a:p>
             <a:fld id="{2CB84BBD-8394-4C49-A765-E0B955FBE0CA}" type="datetimeFigureOut">
               <a:rPr lang="id-ID" smtClean="0"/>
-              <a:t>16/09/2020</a:t>
+              <a:t>19/09/2020</a:t>
             </a:fld>
             <a:endParaRPr lang="id-ID"/>
           </a:p>
@@ -2105,7 +2106,7 @@
           <a:p>
             <a:fld id="{2CB84BBD-8394-4C49-A765-E0B955FBE0CA}" type="datetimeFigureOut">
               <a:rPr lang="id-ID" smtClean="0"/>
-              <a:t>16/09/2020</a:t>
+              <a:t>19/09/2020</a:t>
             </a:fld>
             <a:endParaRPr lang="id-ID"/>
           </a:p>
@@ -2358,7 +2359,7 @@
           <a:p>
             <a:fld id="{2CB84BBD-8394-4C49-A765-E0B955FBE0CA}" type="datetimeFigureOut">
               <a:rPr lang="id-ID" smtClean="0"/>
-              <a:t>16/09/2020</a:t>
+              <a:t>19/09/2020</a:t>
             </a:fld>
             <a:endParaRPr lang="id-ID"/>
           </a:p>
@@ -2571,7 +2572,7 @@
           <a:p>
             <a:fld id="{2CB84BBD-8394-4C49-A765-E0B955FBE0CA}" type="datetimeFigureOut">
               <a:rPr lang="id-ID" smtClean="0"/>
-              <a:t>16/09/2020</a:t>
+              <a:t>19/09/2020</a:t>
             </a:fld>
             <a:endParaRPr lang="id-ID"/>
           </a:p>
@@ -7403,8 +7404,1997 @@
               <a:t>Model </a:t>
             </a:r>
             <a:r>
-              <a:rPr lang="en-US" dirty="0" err="1" smtClean="0"/>
-              <a:t>SQR+Shadow</a:t>
+              <a:rPr lang="en-US" smtClean="0"/>
+              <a:t>SQRshadow</a:t>
+            </a:r>
+            <a:endParaRPr lang="id-ID" dirty="0"/>
+          </a:p>
+        </p:txBody>
+      </p:sp>
+      <p:sp>
+        <p:nvSpPr>
+          <p:cNvPr id="3" name="Content Placeholder 2"/>
+          <p:cNvSpPr>
+            <a:spLocks noGrp="1"/>
+          </p:cNvSpPr>
+          <p:nvPr>
+            <p:ph idx="1"/>
+          </p:nvPr>
+        </p:nvSpPr>
+        <p:spPr>
+          <a:xfrm>
+            <a:off x="7167824" y="1321983"/>
+            <a:ext cx="5024176" cy="2567007"/>
+          </a:xfrm>
+        </p:spPr>
+        <p:txBody>
+          <a:bodyPr>
+            <a:normAutofit/>
+          </a:bodyPr>
+          <a:lstStyle/>
+          <a:p>
+            <a:r>
+              <a:rPr lang="en-US" dirty="0" smtClean="0">
+                <a:latin typeface="Times New Roman" panose="02020603050405020304" pitchFamily="18" charset="0"/>
+                <a:cs typeface="Times New Roman" panose="02020603050405020304" pitchFamily="18" charset="0"/>
+              </a:rPr>
+              <a:t>S: Susceptible</a:t>
+            </a:r>
+          </a:p>
+          <a:p>
+            <a:r>
+              <a:rPr lang="en-US" dirty="0" smtClean="0">
+                <a:latin typeface="Times New Roman" panose="02020603050405020304" pitchFamily="18" charset="0"/>
+                <a:cs typeface="Times New Roman" panose="02020603050405020304" pitchFamily="18" charset="0"/>
+              </a:rPr>
+              <a:t>Q: Quarantined (Infected tested)</a:t>
+            </a:r>
+          </a:p>
+          <a:p>
+            <a:r>
+              <a:rPr lang="en-US" dirty="0" smtClean="0">
+                <a:latin typeface="Times New Roman" panose="02020603050405020304" pitchFamily="18" charset="0"/>
+                <a:cs typeface="Times New Roman" panose="02020603050405020304" pitchFamily="18" charset="0"/>
+              </a:rPr>
+              <a:t>R: Recovered</a:t>
+            </a:r>
+          </a:p>
+          <a:p>
+            <a:r>
+              <a:rPr lang="en-US" dirty="0" smtClean="0">
+                <a:latin typeface="Times New Roman" panose="02020603050405020304" pitchFamily="18" charset="0"/>
+                <a:cs typeface="Times New Roman" panose="02020603050405020304" pitchFamily="18" charset="0"/>
+              </a:rPr>
+              <a:t>D: Dead</a:t>
+            </a:r>
+            <a:endParaRPr lang="id-ID" dirty="0">
+              <a:latin typeface="Times New Roman" panose="02020603050405020304" pitchFamily="18" charset="0"/>
+              <a:cs typeface="Times New Roman" panose="02020603050405020304" pitchFamily="18" charset="0"/>
+            </a:endParaRPr>
+          </a:p>
+        </p:txBody>
+      </p:sp>
+      <p:sp>
+        <p:nvSpPr>
+          <p:cNvPr id="4" name="Rounded Rectangle 3"/>
+          <p:cNvSpPr/>
+          <p:nvPr/>
+        </p:nvSpPr>
+        <p:spPr>
+          <a:xfrm>
+            <a:off x="748778" y="3566205"/>
+            <a:ext cx="1002844" cy="1054812"/>
+          </a:xfrm>
+          <a:prstGeom prst="roundRect">
+            <a:avLst/>
+          </a:prstGeom>
+        </p:spPr>
+        <p:style>
+          <a:lnRef idx="2">
+            <a:schemeClr val="accent1">
+              <a:shade val="50000"/>
+            </a:schemeClr>
+          </a:lnRef>
+          <a:fillRef idx="1">
+            <a:schemeClr val="accent1"/>
+          </a:fillRef>
+          <a:effectRef idx="0">
+            <a:schemeClr val="accent1"/>
+          </a:effectRef>
+          <a:fontRef idx="minor">
+            <a:schemeClr val="lt1"/>
+          </a:fontRef>
+        </p:style>
+        <p:txBody>
+          <a:bodyPr rtlCol="0" anchor="ctr"/>
+          <a:lstStyle/>
+          <a:p>
+            <a:pPr algn="ctr"/>
+            <a:r>
+              <a:rPr lang="en-US" sz="3200" dirty="0" smtClean="0">
+                <a:latin typeface="Times New Roman" panose="02020603050405020304" pitchFamily="18" charset="0"/>
+                <a:cs typeface="Times New Roman" panose="02020603050405020304" pitchFamily="18" charset="0"/>
+              </a:rPr>
+              <a:t>S</a:t>
+            </a:r>
+            <a:endParaRPr lang="id-ID" sz="3200" dirty="0">
+              <a:latin typeface="Times New Roman" panose="02020603050405020304" pitchFamily="18" charset="0"/>
+              <a:cs typeface="Times New Roman" panose="02020603050405020304" pitchFamily="18" charset="0"/>
+            </a:endParaRPr>
+          </a:p>
+        </p:txBody>
+      </p:sp>
+      <p:sp>
+        <p:nvSpPr>
+          <p:cNvPr id="8" name="Rounded Rectangle 7"/>
+          <p:cNvSpPr/>
+          <p:nvPr/>
+        </p:nvSpPr>
+        <p:spPr>
+          <a:xfrm>
+            <a:off x="5889928" y="1619236"/>
+            <a:ext cx="1002844" cy="1054812"/>
+          </a:xfrm>
+          <a:prstGeom prst="roundRect">
+            <a:avLst/>
+          </a:prstGeom>
+          <a:solidFill>
+            <a:srgbClr val="00B050"/>
+          </a:solidFill>
+        </p:spPr>
+        <p:style>
+          <a:lnRef idx="2">
+            <a:schemeClr val="accent1">
+              <a:shade val="50000"/>
+            </a:schemeClr>
+          </a:lnRef>
+          <a:fillRef idx="1">
+            <a:schemeClr val="accent1"/>
+          </a:fillRef>
+          <a:effectRef idx="0">
+            <a:schemeClr val="accent1"/>
+          </a:effectRef>
+          <a:fontRef idx="minor">
+            <a:schemeClr val="lt1"/>
+          </a:fontRef>
+        </p:style>
+        <p:txBody>
+          <a:bodyPr rtlCol="0" anchor="ctr"/>
+          <a:lstStyle/>
+          <a:p>
+            <a:pPr algn="ctr"/>
+            <a:r>
+              <a:rPr lang="en-US" sz="3200" dirty="0">
+                <a:latin typeface="Times New Roman" panose="02020603050405020304" pitchFamily="18" charset="0"/>
+                <a:cs typeface="Times New Roman" panose="02020603050405020304" pitchFamily="18" charset="0"/>
+              </a:rPr>
+              <a:t>R</a:t>
+            </a:r>
+            <a:endParaRPr lang="id-ID" sz="3200" dirty="0">
+              <a:latin typeface="Times New Roman" panose="02020603050405020304" pitchFamily="18" charset="0"/>
+              <a:cs typeface="Times New Roman" panose="02020603050405020304" pitchFamily="18" charset="0"/>
+            </a:endParaRPr>
+          </a:p>
+        </p:txBody>
+      </p:sp>
+      <p:sp>
+        <p:nvSpPr>
+          <p:cNvPr id="9" name="Rounded Rectangle 8"/>
+          <p:cNvSpPr/>
+          <p:nvPr/>
+        </p:nvSpPr>
+        <p:spPr>
+          <a:xfrm>
+            <a:off x="5886183" y="2931988"/>
+            <a:ext cx="1002844" cy="1054812"/>
+          </a:xfrm>
+          <a:prstGeom prst="roundRect">
+            <a:avLst/>
+          </a:prstGeom>
+          <a:solidFill>
+            <a:srgbClr val="FF0000"/>
+          </a:solidFill>
+        </p:spPr>
+        <p:style>
+          <a:lnRef idx="2">
+            <a:schemeClr val="accent1">
+              <a:shade val="50000"/>
+            </a:schemeClr>
+          </a:lnRef>
+          <a:fillRef idx="1">
+            <a:schemeClr val="accent1"/>
+          </a:fillRef>
+          <a:effectRef idx="0">
+            <a:schemeClr val="accent1"/>
+          </a:effectRef>
+          <a:fontRef idx="minor">
+            <a:schemeClr val="lt1"/>
+          </a:fontRef>
+        </p:style>
+        <p:txBody>
+          <a:bodyPr rtlCol="0" anchor="ctr"/>
+          <a:lstStyle/>
+          <a:p>
+            <a:pPr algn="ctr"/>
+            <a:r>
+              <a:rPr lang="en-US" sz="3200" dirty="0" smtClean="0">
+                <a:latin typeface="Times New Roman" panose="02020603050405020304" pitchFamily="18" charset="0"/>
+                <a:cs typeface="Times New Roman" panose="02020603050405020304" pitchFamily="18" charset="0"/>
+              </a:rPr>
+              <a:t>D</a:t>
+            </a:r>
+            <a:endParaRPr lang="id-ID" sz="3200" dirty="0">
+              <a:latin typeface="Times New Roman" panose="02020603050405020304" pitchFamily="18" charset="0"/>
+              <a:cs typeface="Times New Roman" panose="02020603050405020304" pitchFamily="18" charset="0"/>
+            </a:endParaRPr>
+          </a:p>
+        </p:txBody>
+      </p:sp>
+      <mc:AlternateContent xmlns:mc="http://schemas.openxmlformats.org/markup-compatibility/2006" xmlns:a14="http://schemas.microsoft.com/office/drawing/2010/main">
+        <mc:Choice Requires="a14">
+          <p:sp>
+            <p:nvSpPr>
+              <p:cNvPr id="20" name="TextBox 19"/>
+              <p:cNvSpPr txBox="1"/>
+              <p:nvPr/>
+            </p:nvSpPr>
+            <p:spPr>
+              <a:xfrm>
+                <a:off x="2137876" y="2999683"/>
+                <a:ext cx="199349" cy="276999"/>
+              </a:xfrm>
+              <a:prstGeom prst="rect">
+                <a:avLst/>
+              </a:prstGeom>
+              <a:noFill/>
+            </p:spPr>
+            <p:txBody>
+              <a:bodyPr wrap="none" lIns="0" tIns="0" rIns="0" bIns="0" rtlCol="0">
+                <a:spAutoFit/>
+              </a:bodyPr>
+              <a:lstStyle/>
+              <a:p>
+                <a:pPr/>
+                <a14:m>
+                  <m:oMathPara xmlns:m="http://schemas.openxmlformats.org/officeDocument/2006/math">
+                    <m:oMathParaPr>
+                      <m:jc m:val="centerGroup"/>
+                    </m:oMathParaPr>
+                    <m:oMath xmlns:m="http://schemas.openxmlformats.org/officeDocument/2006/math">
+                      <m:r>
+                        <a:rPr lang="en-US" b="0" i="1" smtClean="0">
+                          <a:latin typeface="Cambria Math" panose="02040503050406030204" pitchFamily="18" charset="0"/>
+                        </a:rPr>
+                        <m:t>𝛽</m:t>
+                      </m:r>
+                    </m:oMath>
+                  </m:oMathPara>
+                </a14:m>
+                <a:endParaRPr lang="id-ID" dirty="0"/>
+              </a:p>
+            </p:txBody>
+          </p:sp>
+        </mc:Choice>
+        <mc:Fallback xmlns="">
+          <p:sp>
+            <p:nvSpPr>
+              <p:cNvPr id="20" name="TextBox 19"/>
+              <p:cNvSpPr txBox="1">
+                <a:spLocks noRot="1" noChangeAspect="1" noMove="1" noResize="1" noEditPoints="1" noAdjustHandles="1" noChangeArrowheads="1" noChangeShapeType="1" noTextEdit="1"/>
+              </p:cNvSpPr>
+              <p:nvPr/>
+            </p:nvSpPr>
+            <p:spPr>
+              <a:xfrm>
+                <a:off x="2137876" y="2999683"/>
+                <a:ext cx="199349" cy="276999"/>
+              </a:xfrm>
+              <a:prstGeom prst="rect">
+                <a:avLst/>
+              </a:prstGeom>
+              <a:blipFill rotWithShape="0">
+                <a:blip r:embed="rId2"/>
+                <a:stretch>
+                  <a:fillRect l="-43750" t="-2174" r="-40625" b="-32609"/>
+                </a:stretch>
+              </a:blipFill>
+            </p:spPr>
+            <p:txBody>
+              <a:bodyPr/>
+              <a:lstStyle/>
+              <a:p>
+                <a:r>
+                  <a:rPr lang="id-ID">
+                    <a:noFill/>
+                  </a:rPr>
+                  <a:t> </a:t>
+                </a:r>
+              </a:p>
+            </p:txBody>
+          </p:sp>
+        </mc:Fallback>
+      </mc:AlternateContent>
+      <mc:AlternateContent xmlns:mc="http://schemas.openxmlformats.org/markup-compatibility/2006" xmlns:a14="http://schemas.microsoft.com/office/drawing/2010/main">
+        <mc:Choice Requires="a14">
+          <p:sp>
+            <p:nvSpPr>
+              <p:cNvPr id="22" name="TextBox 21"/>
+              <p:cNvSpPr txBox="1"/>
+              <p:nvPr/>
+            </p:nvSpPr>
+            <p:spPr>
+              <a:xfrm>
+                <a:off x="4933584" y="2157296"/>
+                <a:ext cx="180947" cy="276999"/>
+              </a:xfrm>
+              <a:prstGeom prst="rect">
+                <a:avLst/>
+              </a:prstGeom>
+              <a:noFill/>
+            </p:spPr>
+            <p:txBody>
+              <a:bodyPr wrap="none" lIns="0" tIns="0" rIns="0" bIns="0" rtlCol="0">
+                <a:spAutoFit/>
+              </a:bodyPr>
+              <a:lstStyle/>
+              <a:p>
+                <a:pPr/>
+                <a14:m>
+                  <m:oMathPara xmlns:m="http://schemas.openxmlformats.org/officeDocument/2006/math">
+                    <m:oMathParaPr>
+                      <m:jc m:val="centerGroup"/>
+                    </m:oMathParaPr>
+                    <m:oMath xmlns:m="http://schemas.openxmlformats.org/officeDocument/2006/math">
+                      <m:r>
+                        <a:rPr lang="en-US" b="0" i="1" smtClean="0">
+                          <a:latin typeface="Cambria Math" panose="02040503050406030204" pitchFamily="18" charset="0"/>
+                        </a:rPr>
+                        <m:t>𝛾</m:t>
+                      </m:r>
+                    </m:oMath>
+                  </m:oMathPara>
+                </a14:m>
+                <a:endParaRPr lang="id-ID" dirty="0"/>
+              </a:p>
+            </p:txBody>
+          </p:sp>
+        </mc:Choice>
+        <mc:Fallback xmlns="">
+          <p:sp>
+            <p:nvSpPr>
+              <p:cNvPr id="22" name="TextBox 21"/>
+              <p:cNvSpPr txBox="1">
+                <a:spLocks noRot="1" noChangeAspect="1" noMove="1" noResize="1" noEditPoints="1" noAdjustHandles="1" noChangeArrowheads="1" noChangeShapeType="1" noTextEdit="1"/>
+              </p:cNvSpPr>
+              <p:nvPr/>
+            </p:nvSpPr>
+            <p:spPr>
+              <a:xfrm>
+                <a:off x="4933584" y="2157296"/>
+                <a:ext cx="180947" cy="276999"/>
+              </a:xfrm>
+              <a:prstGeom prst="rect">
+                <a:avLst/>
+              </a:prstGeom>
+              <a:blipFill rotWithShape="0">
+                <a:blip r:embed="rId3"/>
+                <a:stretch>
+                  <a:fillRect l="-30000" r="-26667" b="-22222"/>
+                </a:stretch>
+              </a:blipFill>
+            </p:spPr>
+            <p:txBody>
+              <a:bodyPr/>
+              <a:lstStyle/>
+              <a:p>
+                <a:r>
+                  <a:rPr lang="id-ID">
+                    <a:noFill/>
+                  </a:rPr>
+                  <a:t> </a:t>
+                </a:r>
+              </a:p>
+            </p:txBody>
+          </p:sp>
+        </mc:Fallback>
+      </mc:AlternateContent>
+      <p:sp>
+        <p:nvSpPr>
+          <p:cNvPr id="34" name="Rounded Rectangle 33"/>
+          <p:cNvSpPr/>
+          <p:nvPr/>
+        </p:nvSpPr>
+        <p:spPr>
+          <a:xfrm>
+            <a:off x="3160741" y="2363853"/>
+            <a:ext cx="1002844" cy="1054812"/>
+          </a:xfrm>
+          <a:prstGeom prst="roundRect">
+            <a:avLst/>
+          </a:prstGeom>
+          <a:solidFill>
+            <a:srgbClr val="FF31FA"/>
+          </a:solidFill>
+        </p:spPr>
+        <p:style>
+          <a:lnRef idx="2">
+            <a:schemeClr val="accent1">
+              <a:shade val="50000"/>
+            </a:schemeClr>
+          </a:lnRef>
+          <a:fillRef idx="1">
+            <a:schemeClr val="accent1"/>
+          </a:fillRef>
+          <a:effectRef idx="0">
+            <a:schemeClr val="accent1"/>
+          </a:effectRef>
+          <a:fontRef idx="minor">
+            <a:schemeClr val="lt1"/>
+          </a:fontRef>
+        </p:style>
+        <p:txBody>
+          <a:bodyPr rtlCol="0" anchor="ctr"/>
+          <a:lstStyle/>
+          <a:p>
+            <a:pPr algn="ctr"/>
+            <a:r>
+              <a:rPr lang="en-US" sz="3200" dirty="0" smtClean="0">
+                <a:solidFill>
+                  <a:schemeClr val="bg1"/>
+                </a:solidFill>
+                <a:latin typeface="Times New Roman" panose="02020603050405020304" pitchFamily="18" charset="0"/>
+                <a:cs typeface="Times New Roman" panose="02020603050405020304" pitchFamily="18" charset="0"/>
+              </a:rPr>
+              <a:t>Q</a:t>
+            </a:r>
+            <a:endParaRPr lang="id-ID" sz="3200" dirty="0">
+              <a:solidFill>
+                <a:schemeClr val="bg1"/>
+              </a:solidFill>
+              <a:latin typeface="Times New Roman" panose="02020603050405020304" pitchFamily="18" charset="0"/>
+              <a:cs typeface="Times New Roman" panose="02020603050405020304" pitchFamily="18" charset="0"/>
+            </a:endParaRPr>
+          </a:p>
+        </p:txBody>
+      </p:sp>
+      <p:cxnSp>
+        <p:nvCxnSpPr>
+          <p:cNvPr id="55" name="Straight Arrow Connector 54"/>
+          <p:cNvCxnSpPr>
+            <a:stCxn id="4" idx="3"/>
+            <a:endCxn id="34" idx="1"/>
+          </p:cNvCxnSpPr>
+          <p:nvPr/>
+        </p:nvCxnSpPr>
+        <p:spPr>
+          <a:xfrm flipV="1">
+            <a:off x="1751622" y="2891259"/>
+            <a:ext cx="1409119" cy="1202352"/>
+          </a:xfrm>
+          <a:prstGeom prst="straightConnector1">
+            <a:avLst/>
+          </a:prstGeom>
+          <a:ln w="38100">
+            <a:solidFill>
+              <a:schemeClr val="tx1"/>
+            </a:solidFill>
+            <a:tailEnd type="triangle"/>
+          </a:ln>
+        </p:spPr>
+        <p:style>
+          <a:lnRef idx="1">
+            <a:schemeClr val="accent1"/>
+          </a:lnRef>
+          <a:fillRef idx="0">
+            <a:schemeClr val="accent1"/>
+          </a:fillRef>
+          <a:effectRef idx="0">
+            <a:schemeClr val="accent1"/>
+          </a:effectRef>
+          <a:fontRef idx="minor">
+            <a:schemeClr val="tx1"/>
+          </a:fontRef>
+        </p:style>
+      </p:cxnSp>
+      <p:cxnSp>
+        <p:nvCxnSpPr>
+          <p:cNvPr id="59" name="Straight Arrow Connector 58"/>
+          <p:cNvCxnSpPr>
+            <a:stCxn id="34" idx="3"/>
+            <a:endCxn id="8" idx="1"/>
+          </p:cNvCxnSpPr>
+          <p:nvPr/>
+        </p:nvCxnSpPr>
+        <p:spPr>
+          <a:xfrm flipV="1">
+            <a:off x="4163585" y="2146642"/>
+            <a:ext cx="1726343" cy="744617"/>
+          </a:xfrm>
+          <a:prstGeom prst="straightConnector1">
+            <a:avLst/>
+          </a:prstGeom>
+          <a:ln w="38100">
+            <a:solidFill>
+              <a:schemeClr val="tx1"/>
+            </a:solidFill>
+            <a:tailEnd type="triangle"/>
+          </a:ln>
+        </p:spPr>
+        <p:style>
+          <a:lnRef idx="1">
+            <a:schemeClr val="accent1"/>
+          </a:lnRef>
+          <a:fillRef idx="0">
+            <a:schemeClr val="accent1"/>
+          </a:fillRef>
+          <a:effectRef idx="0">
+            <a:schemeClr val="accent1"/>
+          </a:effectRef>
+          <a:fontRef idx="minor">
+            <a:schemeClr val="tx1"/>
+          </a:fontRef>
+        </p:style>
+      </p:cxnSp>
+      <p:cxnSp>
+        <p:nvCxnSpPr>
+          <p:cNvPr id="78" name="Straight Arrow Connector 77"/>
+          <p:cNvCxnSpPr>
+            <a:stCxn id="34" idx="3"/>
+            <a:endCxn id="9" idx="1"/>
+          </p:cNvCxnSpPr>
+          <p:nvPr/>
+        </p:nvCxnSpPr>
+        <p:spPr>
+          <a:xfrm>
+            <a:off x="4163585" y="2891259"/>
+            <a:ext cx="1722598" cy="568135"/>
+          </a:xfrm>
+          <a:prstGeom prst="straightConnector1">
+            <a:avLst/>
+          </a:prstGeom>
+          <a:ln w="38100">
+            <a:solidFill>
+              <a:schemeClr val="tx1"/>
+            </a:solidFill>
+            <a:tailEnd type="triangle"/>
+          </a:ln>
+        </p:spPr>
+        <p:style>
+          <a:lnRef idx="1">
+            <a:schemeClr val="accent1"/>
+          </a:lnRef>
+          <a:fillRef idx="0">
+            <a:schemeClr val="accent1"/>
+          </a:fillRef>
+          <a:effectRef idx="0">
+            <a:schemeClr val="accent1"/>
+          </a:effectRef>
+          <a:fontRef idx="minor">
+            <a:schemeClr val="tx1"/>
+          </a:fontRef>
+        </p:style>
+      </p:cxnSp>
+      <mc:AlternateContent xmlns:mc="http://schemas.openxmlformats.org/markup-compatibility/2006" xmlns:a14="http://schemas.microsoft.com/office/drawing/2010/main">
+        <mc:Choice Requires="a14">
+          <p:sp>
+            <p:nvSpPr>
+              <p:cNvPr id="81" name="TextBox 80"/>
+              <p:cNvSpPr txBox="1"/>
+              <p:nvPr/>
+            </p:nvSpPr>
+            <p:spPr>
+              <a:xfrm>
+                <a:off x="4933584" y="3251047"/>
+                <a:ext cx="260135" cy="276999"/>
+              </a:xfrm>
+              <a:prstGeom prst="rect">
+                <a:avLst/>
+              </a:prstGeom>
+              <a:noFill/>
+            </p:spPr>
+            <p:txBody>
+              <a:bodyPr wrap="none" lIns="0" tIns="0" rIns="0" bIns="0" rtlCol="0">
+                <a:spAutoFit/>
+              </a:bodyPr>
+              <a:lstStyle/>
+              <a:p>
+                <a:pPr/>
+                <a14:m>
+                  <m:oMathPara xmlns:m="http://schemas.openxmlformats.org/officeDocument/2006/math">
+                    <m:oMathParaPr>
+                      <m:jc m:val="centerGroup"/>
+                    </m:oMathParaPr>
+                    <m:oMath xmlns:m="http://schemas.openxmlformats.org/officeDocument/2006/math">
+                      <m:sSub>
+                        <m:sSubPr>
+                          <m:ctrlPr>
+                            <a:rPr lang="en-US" b="0" i="1" smtClean="0">
+                              <a:latin typeface="Cambria Math" panose="02040503050406030204" pitchFamily="18" charset="0"/>
+                            </a:rPr>
+                          </m:ctrlPr>
+                        </m:sSubPr>
+                        <m:e>
+                          <m:r>
+                            <a:rPr lang="en-US" b="0" i="1" smtClean="0">
+                              <a:latin typeface="Cambria Math" panose="02040503050406030204" pitchFamily="18" charset="0"/>
+                            </a:rPr>
+                            <m:t>𝜇</m:t>
+                          </m:r>
+                        </m:e>
+                        <m:sub>
+                          <m:r>
+                            <a:rPr lang="en-US" b="0" i="1" smtClean="0">
+                              <a:latin typeface="Cambria Math" panose="02040503050406030204" pitchFamily="18" charset="0"/>
+                            </a:rPr>
+                            <m:t>𝐼</m:t>
+                          </m:r>
+                        </m:sub>
+                      </m:sSub>
+                    </m:oMath>
+                  </m:oMathPara>
+                </a14:m>
+                <a:endParaRPr lang="id-ID" dirty="0"/>
+              </a:p>
+            </p:txBody>
+          </p:sp>
+        </mc:Choice>
+        <mc:Fallback xmlns="">
+          <p:sp>
+            <p:nvSpPr>
+              <p:cNvPr id="81" name="TextBox 80"/>
+              <p:cNvSpPr txBox="1">
+                <a:spLocks noRot="1" noChangeAspect="1" noMove="1" noResize="1" noEditPoints="1" noAdjustHandles="1" noChangeArrowheads="1" noChangeShapeType="1" noTextEdit="1"/>
+              </p:cNvSpPr>
+              <p:nvPr/>
+            </p:nvSpPr>
+            <p:spPr>
+              <a:xfrm>
+                <a:off x="4933584" y="3251047"/>
+                <a:ext cx="260135" cy="276999"/>
+              </a:xfrm>
+              <a:prstGeom prst="rect">
+                <a:avLst/>
+              </a:prstGeom>
+              <a:blipFill rotWithShape="0">
+                <a:blip r:embed="rId4"/>
+                <a:stretch>
+                  <a:fillRect l="-20930" r="-6977" b="-21739"/>
+                </a:stretch>
+              </a:blipFill>
+            </p:spPr>
+            <p:txBody>
+              <a:bodyPr/>
+              <a:lstStyle/>
+              <a:p>
+                <a:r>
+                  <a:rPr lang="id-ID">
+                    <a:noFill/>
+                  </a:rPr>
+                  <a:t> </a:t>
+                </a:r>
+              </a:p>
+            </p:txBody>
+          </p:sp>
+        </mc:Fallback>
+      </mc:AlternateContent>
+      <p:sp>
+        <p:nvSpPr>
+          <p:cNvPr id="39" name="Rounded Rectangle 38"/>
+          <p:cNvSpPr/>
+          <p:nvPr/>
+        </p:nvSpPr>
+        <p:spPr>
+          <a:xfrm>
+            <a:off x="5821261" y="4245486"/>
+            <a:ext cx="1002844" cy="1054812"/>
+          </a:xfrm>
+          <a:prstGeom prst="roundRect">
+            <a:avLst/>
+          </a:prstGeom>
+          <a:solidFill>
+            <a:srgbClr val="00B050">
+              <a:alpha val="50000"/>
+            </a:srgbClr>
+          </a:solidFill>
+        </p:spPr>
+        <p:style>
+          <a:lnRef idx="2">
+            <a:schemeClr val="accent1">
+              <a:shade val="50000"/>
+            </a:schemeClr>
+          </a:lnRef>
+          <a:fillRef idx="1">
+            <a:schemeClr val="accent1"/>
+          </a:fillRef>
+          <a:effectRef idx="0">
+            <a:schemeClr val="accent1"/>
+          </a:effectRef>
+          <a:fontRef idx="minor">
+            <a:schemeClr val="lt1"/>
+          </a:fontRef>
+        </p:style>
+        <p:txBody>
+          <a:bodyPr rtlCol="0" anchor="ctr"/>
+          <a:lstStyle/>
+          <a:p>
+            <a:pPr algn="ctr"/>
+            <a:r>
+              <a:rPr lang="en-US" sz="3200" dirty="0" err="1" smtClean="0">
+                <a:latin typeface="Times New Roman" panose="02020603050405020304" pitchFamily="18" charset="0"/>
+                <a:cs typeface="Times New Roman" panose="02020603050405020304" pitchFamily="18" charset="0"/>
+              </a:rPr>
+              <a:t>R</a:t>
+            </a:r>
+            <a:r>
+              <a:rPr lang="en-US" sz="3200" baseline="-25000" dirty="0" err="1" smtClean="0">
+                <a:latin typeface="Times New Roman" panose="02020603050405020304" pitchFamily="18" charset="0"/>
+                <a:cs typeface="Times New Roman" panose="02020603050405020304" pitchFamily="18" charset="0"/>
+              </a:rPr>
+              <a:t>s</a:t>
+            </a:r>
+            <a:endParaRPr lang="id-ID" sz="3200" dirty="0">
+              <a:latin typeface="Times New Roman" panose="02020603050405020304" pitchFamily="18" charset="0"/>
+              <a:cs typeface="Times New Roman" panose="02020603050405020304" pitchFamily="18" charset="0"/>
+            </a:endParaRPr>
+          </a:p>
+        </p:txBody>
+      </p:sp>
+      <p:sp>
+        <p:nvSpPr>
+          <p:cNvPr id="40" name="Rounded Rectangle 39"/>
+          <p:cNvSpPr/>
+          <p:nvPr/>
+        </p:nvSpPr>
+        <p:spPr>
+          <a:xfrm>
+            <a:off x="5821261" y="5491274"/>
+            <a:ext cx="1002844" cy="1054812"/>
+          </a:xfrm>
+          <a:prstGeom prst="roundRect">
+            <a:avLst/>
+          </a:prstGeom>
+          <a:solidFill>
+            <a:srgbClr val="FF0000">
+              <a:alpha val="50000"/>
+            </a:srgbClr>
+          </a:solidFill>
+        </p:spPr>
+        <p:style>
+          <a:lnRef idx="2">
+            <a:schemeClr val="accent1">
+              <a:shade val="50000"/>
+            </a:schemeClr>
+          </a:lnRef>
+          <a:fillRef idx="1">
+            <a:schemeClr val="accent1"/>
+          </a:fillRef>
+          <a:effectRef idx="0">
+            <a:schemeClr val="accent1"/>
+          </a:effectRef>
+          <a:fontRef idx="minor">
+            <a:schemeClr val="lt1"/>
+          </a:fontRef>
+        </p:style>
+        <p:txBody>
+          <a:bodyPr rtlCol="0" anchor="ctr"/>
+          <a:lstStyle/>
+          <a:p>
+            <a:pPr algn="ctr"/>
+            <a:r>
+              <a:rPr lang="en-US" sz="3200" dirty="0" smtClean="0">
+                <a:latin typeface="Times New Roman" panose="02020603050405020304" pitchFamily="18" charset="0"/>
+                <a:cs typeface="Times New Roman" panose="02020603050405020304" pitchFamily="18" charset="0"/>
+              </a:rPr>
+              <a:t>D</a:t>
+            </a:r>
+            <a:r>
+              <a:rPr lang="en-US" sz="3200" baseline="-25000" dirty="0" smtClean="0">
+                <a:latin typeface="Times New Roman" panose="02020603050405020304" pitchFamily="18" charset="0"/>
+                <a:cs typeface="Times New Roman" panose="02020603050405020304" pitchFamily="18" charset="0"/>
+              </a:rPr>
+              <a:t>s</a:t>
+            </a:r>
+            <a:endParaRPr lang="id-ID" sz="3200" dirty="0">
+              <a:latin typeface="Times New Roman" panose="02020603050405020304" pitchFamily="18" charset="0"/>
+              <a:cs typeface="Times New Roman" panose="02020603050405020304" pitchFamily="18" charset="0"/>
+            </a:endParaRPr>
+          </a:p>
+        </p:txBody>
+      </p:sp>
+      <mc:AlternateContent xmlns:mc="http://schemas.openxmlformats.org/markup-compatibility/2006">
+        <mc:Choice xmlns:a14="http://schemas.microsoft.com/office/drawing/2010/main" Requires="a14">
+          <p:sp>
+            <p:nvSpPr>
+              <p:cNvPr id="41" name="TextBox 40"/>
+              <p:cNvSpPr txBox="1"/>
+              <p:nvPr/>
+            </p:nvSpPr>
+            <p:spPr>
+              <a:xfrm>
+                <a:off x="2085553" y="4662125"/>
+                <a:ext cx="272447" cy="276999"/>
+              </a:xfrm>
+              <a:prstGeom prst="rect">
+                <a:avLst/>
+              </a:prstGeom>
+              <a:noFill/>
+            </p:spPr>
+            <p:txBody>
+              <a:bodyPr wrap="none" lIns="0" tIns="0" rIns="0" bIns="0" rtlCol="0">
+                <a:spAutoFit/>
+              </a:bodyPr>
+              <a:lstStyle/>
+              <a:p>
+                <a:pPr/>
+                <a14:m>
+                  <m:oMathPara xmlns:m="http://schemas.openxmlformats.org/officeDocument/2006/math">
+                    <m:oMathParaPr>
+                      <m:jc m:val="centerGroup"/>
+                    </m:oMathParaPr>
+                    <m:oMath xmlns:m="http://schemas.openxmlformats.org/officeDocument/2006/math">
+                      <m:sSub>
+                        <m:sSubPr>
+                          <m:ctrlPr>
+                            <a:rPr lang="en-US" b="0" i="1" smtClean="0">
+                              <a:latin typeface="Cambria Math" panose="02040503050406030204" pitchFamily="18" charset="0"/>
+                            </a:rPr>
+                          </m:ctrlPr>
+                        </m:sSubPr>
+                        <m:e>
+                          <m:r>
+                            <a:rPr lang="en-US" b="0" i="1" smtClean="0">
+                              <a:latin typeface="Cambria Math" panose="02040503050406030204" pitchFamily="18" charset="0"/>
+                            </a:rPr>
+                            <m:t>𝛽</m:t>
+                          </m:r>
+                        </m:e>
+                        <m:sub>
+                          <m:r>
+                            <a:rPr lang="en-US" b="0" i="1" smtClean="0">
+                              <a:latin typeface="Cambria Math" panose="02040503050406030204" pitchFamily="18" charset="0"/>
+                            </a:rPr>
+                            <m:t>𝑠</m:t>
+                          </m:r>
+                        </m:sub>
+                      </m:sSub>
+                    </m:oMath>
+                  </m:oMathPara>
+                </a14:m>
+                <a:endParaRPr lang="en-US" b="0" dirty="0" smtClean="0"/>
+              </a:p>
+            </p:txBody>
+          </p:sp>
+        </mc:Choice>
+        <mc:Fallback>
+          <p:sp>
+            <p:nvSpPr>
+              <p:cNvPr id="41" name="TextBox 40"/>
+              <p:cNvSpPr txBox="1">
+                <a:spLocks noRot="1" noChangeAspect="1" noMove="1" noResize="1" noEditPoints="1" noAdjustHandles="1" noChangeArrowheads="1" noChangeShapeType="1" noTextEdit="1"/>
+              </p:cNvSpPr>
+              <p:nvPr/>
+            </p:nvSpPr>
+            <p:spPr>
+              <a:xfrm>
+                <a:off x="2085553" y="4662125"/>
+                <a:ext cx="272447" cy="276999"/>
+              </a:xfrm>
+              <a:prstGeom prst="rect">
+                <a:avLst/>
+              </a:prstGeom>
+              <a:blipFill rotWithShape="0">
+                <a:blip r:embed="rId5"/>
+                <a:stretch>
+                  <a:fillRect l="-31111" t="-2222" r="-4444" b="-35556"/>
+                </a:stretch>
+              </a:blipFill>
+            </p:spPr>
+            <p:txBody>
+              <a:bodyPr/>
+              <a:lstStyle/>
+              <a:p>
+                <a:r>
+                  <a:rPr lang="id-ID">
+                    <a:noFill/>
+                  </a:rPr>
+                  <a:t> </a:t>
+                </a:r>
+              </a:p>
+            </p:txBody>
+          </p:sp>
+        </mc:Fallback>
+      </mc:AlternateContent>
+      <mc:AlternateContent xmlns:mc="http://schemas.openxmlformats.org/markup-compatibility/2006" xmlns:a14="http://schemas.microsoft.com/office/drawing/2010/main">
+        <mc:Choice Requires="a14">
+          <p:sp>
+            <p:nvSpPr>
+              <p:cNvPr id="42" name="TextBox 41"/>
+              <p:cNvSpPr txBox="1"/>
+              <p:nvPr/>
+            </p:nvSpPr>
+            <p:spPr>
+              <a:xfrm>
+                <a:off x="4886332" y="4654868"/>
+                <a:ext cx="185756" cy="276999"/>
+              </a:xfrm>
+              <a:prstGeom prst="rect">
+                <a:avLst/>
+              </a:prstGeom>
+              <a:noFill/>
+            </p:spPr>
+            <p:txBody>
+              <a:bodyPr wrap="none" lIns="0" tIns="0" rIns="0" bIns="0" rtlCol="0">
+                <a:spAutoFit/>
+              </a:bodyPr>
+              <a:lstStyle/>
+              <a:p>
+                <a:pPr/>
+                <a14:m>
+                  <m:oMathPara xmlns:m="http://schemas.openxmlformats.org/officeDocument/2006/math">
+                    <m:oMathParaPr>
+                      <m:jc m:val="centerGroup"/>
+                    </m:oMathParaPr>
+                    <m:oMath xmlns:m="http://schemas.openxmlformats.org/officeDocument/2006/math">
+                      <m:r>
+                        <a:rPr lang="en-US" b="0" i="1" smtClean="0">
+                          <a:latin typeface="Cambria Math" panose="02040503050406030204" pitchFamily="18" charset="0"/>
+                        </a:rPr>
+                        <m:t>𝛾</m:t>
+                      </m:r>
+                    </m:oMath>
+                  </m:oMathPara>
+                </a14:m>
+                <a:endParaRPr lang="id-ID" dirty="0"/>
+              </a:p>
+            </p:txBody>
+          </p:sp>
+        </mc:Choice>
+        <mc:Fallback xmlns="">
+          <p:sp>
+            <p:nvSpPr>
+              <p:cNvPr id="42" name="TextBox 41"/>
+              <p:cNvSpPr txBox="1">
+                <a:spLocks noRot="1" noChangeAspect="1" noMove="1" noResize="1" noEditPoints="1" noAdjustHandles="1" noChangeArrowheads="1" noChangeShapeType="1" noTextEdit="1"/>
+              </p:cNvSpPr>
+              <p:nvPr/>
+            </p:nvSpPr>
+            <p:spPr>
+              <a:xfrm>
+                <a:off x="4886332" y="4654868"/>
+                <a:ext cx="185756" cy="276999"/>
+              </a:xfrm>
+              <a:prstGeom prst="rect">
+                <a:avLst/>
+              </a:prstGeom>
+              <a:blipFill rotWithShape="0">
+                <a:blip r:embed="rId6"/>
+                <a:stretch>
+                  <a:fillRect l="-30000" r="-26667" b="-22222"/>
+                </a:stretch>
+              </a:blipFill>
+            </p:spPr>
+            <p:txBody>
+              <a:bodyPr/>
+              <a:lstStyle/>
+              <a:p>
+                <a:r>
+                  <a:rPr lang="id-ID">
+                    <a:noFill/>
+                  </a:rPr>
+                  <a:t> </a:t>
+                </a:r>
+              </a:p>
+            </p:txBody>
+          </p:sp>
+        </mc:Fallback>
+      </mc:AlternateContent>
+      <p:sp>
+        <p:nvSpPr>
+          <p:cNvPr id="43" name="Rounded Rectangle 42"/>
+          <p:cNvSpPr/>
+          <p:nvPr/>
+        </p:nvSpPr>
+        <p:spPr>
+          <a:xfrm>
+            <a:off x="3122800" y="4772892"/>
+            <a:ext cx="1002844" cy="1054812"/>
+          </a:xfrm>
+          <a:prstGeom prst="roundRect">
+            <a:avLst/>
+          </a:prstGeom>
+          <a:solidFill>
+            <a:srgbClr val="FF31FA">
+              <a:alpha val="50000"/>
+            </a:srgbClr>
+          </a:solidFill>
+        </p:spPr>
+        <p:style>
+          <a:lnRef idx="2">
+            <a:schemeClr val="accent1">
+              <a:shade val="50000"/>
+            </a:schemeClr>
+          </a:lnRef>
+          <a:fillRef idx="1">
+            <a:schemeClr val="accent1"/>
+          </a:fillRef>
+          <a:effectRef idx="0">
+            <a:schemeClr val="accent1"/>
+          </a:effectRef>
+          <a:fontRef idx="minor">
+            <a:schemeClr val="lt1"/>
+          </a:fontRef>
+        </p:style>
+        <p:txBody>
+          <a:bodyPr rtlCol="0" anchor="ctr"/>
+          <a:lstStyle/>
+          <a:p>
+            <a:pPr algn="ctr"/>
+            <a:r>
+              <a:rPr lang="en-US" sz="3200" dirty="0" smtClean="0">
+                <a:solidFill>
+                  <a:schemeClr val="bg1"/>
+                </a:solidFill>
+                <a:latin typeface="Times New Roman" panose="02020603050405020304" pitchFamily="18" charset="0"/>
+                <a:cs typeface="Times New Roman" panose="02020603050405020304" pitchFamily="18" charset="0"/>
+              </a:rPr>
+              <a:t>Q</a:t>
+            </a:r>
+            <a:r>
+              <a:rPr lang="en-US" sz="3200" baseline="-25000" dirty="0" smtClean="0">
+                <a:solidFill>
+                  <a:schemeClr val="bg1"/>
+                </a:solidFill>
+                <a:latin typeface="Times New Roman" panose="02020603050405020304" pitchFamily="18" charset="0"/>
+                <a:cs typeface="Times New Roman" panose="02020603050405020304" pitchFamily="18" charset="0"/>
+              </a:rPr>
+              <a:t>s</a:t>
+            </a:r>
+            <a:endParaRPr lang="id-ID" sz="3200" dirty="0">
+              <a:solidFill>
+                <a:schemeClr val="bg1"/>
+              </a:solidFill>
+              <a:latin typeface="Times New Roman" panose="02020603050405020304" pitchFamily="18" charset="0"/>
+              <a:cs typeface="Times New Roman" panose="02020603050405020304" pitchFamily="18" charset="0"/>
+            </a:endParaRPr>
+          </a:p>
+        </p:txBody>
+      </p:sp>
+      <p:cxnSp>
+        <p:nvCxnSpPr>
+          <p:cNvPr id="44" name="Straight Arrow Connector 43"/>
+          <p:cNvCxnSpPr>
+            <a:stCxn id="4" idx="3"/>
+            <a:endCxn id="43" idx="1"/>
+          </p:cNvCxnSpPr>
+          <p:nvPr/>
+        </p:nvCxnSpPr>
+        <p:spPr>
+          <a:xfrm>
+            <a:off x="1751622" y="4093611"/>
+            <a:ext cx="1371178" cy="1206687"/>
+          </a:xfrm>
+          <a:prstGeom prst="straightConnector1">
+            <a:avLst/>
+          </a:prstGeom>
+          <a:ln w="38100">
+            <a:solidFill>
+              <a:schemeClr val="tx1"/>
+            </a:solidFill>
+            <a:tailEnd type="triangle"/>
+          </a:ln>
+        </p:spPr>
+        <p:style>
+          <a:lnRef idx="1">
+            <a:schemeClr val="accent1"/>
+          </a:lnRef>
+          <a:fillRef idx="0">
+            <a:schemeClr val="accent1"/>
+          </a:fillRef>
+          <a:effectRef idx="0">
+            <a:schemeClr val="accent1"/>
+          </a:effectRef>
+          <a:fontRef idx="minor">
+            <a:schemeClr val="tx1"/>
+          </a:fontRef>
+        </p:style>
+      </p:cxnSp>
+      <p:cxnSp>
+        <p:nvCxnSpPr>
+          <p:cNvPr id="45" name="Straight Arrow Connector 44"/>
+          <p:cNvCxnSpPr>
+            <a:stCxn id="43" idx="3"/>
+            <a:endCxn id="39" idx="1"/>
+          </p:cNvCxnSpPr>
+          <p:nvPr/>
+        </p:nvCxnSpPr>
+        <p:spPr>
+          <a:xfrm flipV="1">
+            <a:off x="4125644" y="4772892"/>
+            <a:ext cx="1695617" cy="527406"/>
+          </a:xfrm>
+          <a:prstGeom prst="straightConnector1">
+            <a:avLst/>
+          </a:prstGeom>
+          <a:ln w="38100">
+            <a:solidFill>
+              <a:schemeClr val="tx1"/>
+            </a:solidFill>
+            <a:tailEnd type="triangle"/>
+          </a:ln>
+        </p:spPr>
+        <p:style>
+          <a:lnRef idx="1">
+            <a:schemeClr val="accent1"/>
+          </a:lnRef>
+          <a:fillRef idx="0">
+            <a:schemeClr val="accent1"/>
+          </a:fillRef>
+          <a:effectRef idx="0">
+            <a:schemeClr val="accent1"/>
+          </a:effectRef>
+          <a:fontRef idx="minor">
+            <a:schemeClr val="tx1"/>
+          </a:fontRef>
+        </p:style>
+      </p:cxnSp>
+      <p:cxnSp>
+        <p:nvCxnSpPr>
+          <p:cNvPr id="46" name="Straight Arrow Connector 45"/>
+          <p:cNvCxnSpPr>
+            <a:stCxn id="43" idx="3"/>
+            <a:endCxn id="40" idx="1"/>
+          </p:cNvCxnSpPr>
+          <p:nvPr/>
+        </p:nvCxnSpPr>
+        <p:spPr>
+          <a:xfrm>
+            <a:off x="4125644" y="5300298"/>
+            <a:ext cx="1695617" cy="718382"/>
+          </a:xfrm>
+          <a:prstGeom prst="straightConnector1">
+            <a:avLst/>
+          </a:prstGeom>
+          <a:ln w="38100">
+            <a:solidFill>
+              <a:schemeClr val="tx1"/>
+            </a:solidFill>
+            <a:tailEnd type="triangle"/>
+          </a:ln>
+        </p:spPr>
+        <p:style>
+          <a:lnRef idx="1">
+            <a:schemeClr val="accent1"/>
+          </a:lnRef>
+          <a:fillRef idx="0">
+            <a:schemeClr val="accent1"/>
+          </a:fillRef>
+          <a:effectRef idx="0">
+            <a:schemeClr val="accent1"/>
+          </a:effectRef>
+          <a:fontRef idx="minor">
+            <a:schemeClr val="tx1"/>
+          </a:fontRef>
+        </p:style>
+      </p:cxnSp>
+      <mc:AlternateContent xmlns:mc="http://schemas.openxmlformats.org/markup-compatibility/2006" xmlns:a14="http://schemas.microsoft.com/office/drawing/2010/main">
+        <mc:Choice Requires="a14">
+          <p:sp>
+            <p:nvSpPr>
+              <p:cNvPr id="47" name="TextBox 46"/>
+              <p:cNvSpPr txBox="1"/>
+              <p:nvPr/>
+            </p:nvSpPr>
+            <p:spPr>
+              <a:xfrm>
+                <a:off x="4785481" y="5742333"/>
+                <a:ext cx="264944" cy="276999"/>
+              </a:xfrm>
+              <a:prstGeom prst="rect">
+                <a:avLst/>
+              </a:prstGeom>
+              <a:noFill/>
+            </p:spPr>
+            <p:txBody>
+              <a:bodyPr wrap="none" lIns="0" tIns="0" rIns="0" bIns="0" rtlCol="0">
+                <a:spAutoFit/>
+              </a:bodyPr>
+              <a:lstStyle/>
+              <a:p>
+                <a:pPr/>
+                <a14:m>
+                  <m:oMathPara xmlns:m="http://schemas.openxmlformats.org/officeDocument/2006/math">
+                    <m:oMathParaPr>
+                      <m:jc m:val="centerGroup"/>
+                    </m:oMathParaPr>
+                    <m:oMath xmlns:m="http://schemas.openxmlformats.org/officeDocument/2006/math">
+                      <m:sSub>
+                        <m:sSubPr>
+                          <m:ctrlPr>
+                            <a:rPr lang="en-US" b="0" i="1" smtClean="0">
+                              <a:latin typeface="Cambria Math" panose="02040503050406030204" pitchFamily="18" charset="0"/>
+                            </a:rPr>
+                          </m:ctrlPr>
+                        </m:sSubPr>
+                        <m:e>
+                          <m:r>
+                            <a:rPr lang="en-US" b="0" i="1" smtClean="0">
+                              <a:latin typeface="Cambria Math" panose="02040503050406030204" pitchFamily="18" charset="0"/>
+                            </a:rPr>
+                            <m:t>𝜇</m:t>
+                          </m:r>
+                        </m:e>
+                        <m:sub>
+                          <m:r>
+                            <a:rPr lang="en-US" b="0" i="1" smtClean="0">
+                              <a:latin typeface="Cambria Math" panose="02040503050406030204" pitchFamily="18" charset="0"/>
+                            </a:rPr>
+                            <m:t>𝐼</m:t>
+                          </m:r>
+                        </m:sub>
+                      </m:sSub>
+                    </m:oMath>
+                  </m:oMathPara>
+                </a14:m>
+                <a:endParaRPr lang="id-ID" dirty="0"/>
+              </a:p>
+            </p:txBody>
+          </p:sp>
+        </mc:Choice>
+        <mc:Fallback xmlns="">
+          <p:sp>
+            <p:nvSpPr>
+              <p:cNvPr id="47" name="TextBox 46"/>
+              <p:cNvSpPr txBox="1">
+                <a:spLocks noRot="1" noChangeAspect="1" noMove="1" noResize="1" noEditPoints="1" noAdjustHandles="1" noChangeArrowheads="1" noChangeShapeType="1" noTextEdit="1"/>
+              </p:cNvSpPr>
+              <p:nvPr/>
+            </p:nvSpPr>
+            <p:spPr>
+              <a:xfrm>
+                <a:off x="4785481" y="5742333"/>
+                <a:ext cx="264944" cy="276999"/>
+              </a:xfrm>
+              <a:prstGeom prst="rect">
+                <a:avLst/>
+              </a:prstGeom>
+              <a:blipFill rotWithShape="0">
+                <a:blip r:embed="rId7"/>
+                <a:stretch>
+                  <a:fillRect l="-18605" r="-9302" b="-22222"/>
+                </a:stretch>
+              </a:blipFill>
+            </p:spPr>
+            <p:txBody>
+              <a:bodyPr/>
+              <a:lstStyle/>
+              <a:p>
+                <a:r>
+                  <a:rPr lang="id-ID">
+                    <a:noFill/>
+                  </a:rPr>
+                  <a:t> </a:t>
+                </a:r>
+              </a:p>
+            </p:txBody>
+          </p:sp>
+        </mc:Fallback>
+      </mc:AlternateContent>
+      <p:sp>
+        <p:nvSpPr>
+          <p:cNvPr id="49" name="Content Placeholder 2"/>
+          <p:cNvSpPr txBox="1">
+            <a:spLocks/>
+          </p:cNvSpPr>
+          <p:nvPr/>
+        </p:nvSpPr>
+        <p:spPr>
+          <a:xfrm>
+            <a:off x="7219917" y="3819233"/>
+            <a:ext cx="4883138" cy="2391443"/>
+          </a:xfrm>
+          <a:prstGeom prst="rect">
+            <a:avLst/>
+          </a:prstGeom>
+        </p:spPr>
+        <p:txBody>
+          <a:bodyPr vert="horz" lIns="91440" tIns="45720" rIns="91440" bIns="45720" rtlCol="0">
+            <a:normAutofit/>
+          </a:bodyPr>
+          <a:lstStyle>
+            <a:lvl1pPr marL="228600" indent="-228600" algn="l" defTabSz="914400" rtl="0" eaLnBrk="1" latinLnBrk="0" hangingPunct="1">
+              <a:lnSpc>
+                <a:spcPct val="90000"/>
+              </a:lnSpc>
+              <a:spcBef>
+                <a:spcPts val="1000"/>
+              </a:spcBef>
+              <a:buFont typeface="Arial" panose="020B0604020202020204" pitchFamily="34" charset="0"/>
+              <a:buChar char="•"/>
+              <a:defRPr sz="2800" kern="1200">
+                <a:solidFill>
+                  <a:schemeClr val="tx1"/>
+                </a:solidFill>
+                <a:latin typeface="+mn-lt"/>
+                <a:ea typeface="+mn-ea"/>
+                <a:cs typeface="+mn-cs"/>
+              </a:defRPr>
+            </a:lvl1pPr>
+            <a:lvl2pPr marL="685800" indent="-228600" algn="l" defTabSz="914400" rtl="0" eaLnBrk="1" latinLnBrk="0" hangingPunct="1">
+              <a:lnSpc>
+                <a:spcPct val="90000"/>
+              </a:lnSpc>
+              <a:spcBef>
+                <a:spcPts val="500"/>
+              </a:spcBef>
+              <a:buFont typeface="Arial" panose="020B0604020202020204" pitchFamily="34" charset="0"/>
+              <a:buChar char="•"/>
+              <a:defRPr sz="2400" kern="1200">
+                <a:solidFill>
+                  <a:schemeClr val="tx1"/>
+                </a:solidFill>
+                <a:latin typeface="+mn-lt"/>
+                <a:ea typeface="+mn-ea"/>
+                <a:cs typeface="+mn-cs"/>
+              </a:defRPr>
+            </a:lvl2pPr>
+            <a:lvl3pPr marL="1143000" indent="-228600" algn="l" defTabSz="914400" rtl="0" eaLnBrk="1" latinLnBrk="0" hangingPunct="1">
+              <a:lnSpc>
+                <a:spcPct val="90000"/>
+              </a:lnSpc>
+              <a:spcBef>
+                <a:spcPts val="500"/>
+              </a:spcBef>
+              <a:buFont typeface="Arial" panose="020B0604020202020204" pitchFamily="34" charset="0"/>
+              <a:buChar char="•"/>
+              <a:defRPr sz="2000" kern="1200">
+                <a:solidFill>
+                  <a:schemeClr val="tx1"/>
+                </a:solidFill>
+                <a:latin typeface="+mn-lt"/>
+                <a:ea typeface="+mn-ea"/>
+                <a:cs typeface="+mn-cs"/>
+              </a:defRPr>
+            </a:lvl3pPr>
+            <a:lvl4pPr marL="1600200" indent="-228600" algn="l" defTabSz="914400" rtl="0" eaLnBrk="1" latinLnBrk="0" hangingPunct="1">
+              <a:lnSpc>
+                <a:spcPct val="90000"/>
+              </a:lnSpc>
+              <a:spcBef>
+                <a:spcPts val="500"/>
+              </a:spcBef>
+              <a:buFont typeface="Arial" panose="020B0604020202020204" pitchFamily="34" charset="0"/>
+              <a:buChar char="•"/>
+              <a:defRPr sz="1800" kern="1200">
+                <a:solidFill>
+                  <a:schemeClr val="tx1"/>
+                </a:solidFill>
+                <a:latin typeface="+mn-lt"/>
+                <a:ea typeface="+mn-ea"/>
+                <a:cs typeface="+mn-cs"/>
+              </a:defRPr>
+            </a:lvl4pPr>
+            <a:lvl5pPr marL="2057400" indent="-228600" algn="l" defTabSz="914400" rtl="0" eaLnBrk="1" latinLnBrk="0" hangingPunct="1">
+              <a:lnSpc>
+                <a:spcPct val="90000"/>
+              </a:lnSpc>
+              <a:spcBef>
+                <a:spcPts val="500"/>
+              </a:spcBef>
+              <a:buFont typeface="Arial" panose="020B0604020202020204" pitchFamily="34" charset="0"/>
+              <a:buChar char="•"/>
+              <a:defRPr sz="1800" kern="1200">
+                <a:solidFill>
+                  <a:schemeClr val="tx1"/>
+                </a:solidFill>
+                <a:latin typeface="+mn-lt"/>
+                <a:ea typeface="+mn-ea"/>
+                <a:cs typeface="+mn-cs"/>
+              </a:defRPr>
+            </a:lvl5pPr>
+            <a:lvl6pPr marL="2514600" indent="-228600" algn="l" defTabSz="914400" rtl="0" eaLnBrk="1" latinLnBrk="0" hangingPunct="1">
+              <a:lnSpc>
+                <a:spcPct val="90000"/>
+              </a:lnSpc>
+              <a:spcBef>
+                <a:spcPts val="500"/>
+              </a:spcBef>
+              <a:buFont typeface="Arial" panose="020B0604020202020204" pitchFamily="34" charset="0"/>
+              <a:buChar char="•"/>
+              <a:defRPr sz="1800" kern="1200">
+                <a:solidFill>
+                  <a:schemeClr val="tx1"/>
+                </a:solidFill>
+                <a:latin typeface="+mn-lt"/>
+                <a:ea typeface="+mn-ea"/>
+                <a:cs typeface="+mn-cs"/>
+              </a:defRPr>
+            </a:lvl6pPr>
+            <a:lvl7pPr marL="2971800" indent="-228600" algn="l" defTabSz="914400" rtl="0" eaLnBrk="1" latinLnBrk="0" hangingPunct="1">
+              <a:lnSpc>
+                <a:spcPct val="90000"/>
+              </a:lnSpc>
+              <a:spcBef>
+                <a:spcPts val="500"/>
+              </a:spcBef>
+              <a:buFont typeface="Arial" panose="020B0604020202020204" pitchFamily="34" charset="0"/>
+              <a:buChar char="•"/>
+              <a:defRPr sz="1800" kern="1200">
+                <a:solidFill>
+                  <a:schemeClr val="tx1"/>
+                </a:solidFill>
+                <a:latin typeface="+mn-lt"/>
+                <a:ea typeface="+mn-ea"/>
+                <a:cs typeface="+mn-cs"/>
+              </a:defRPr>
+            </a:lvl7pPr>
+            <a:lvl8pPr marL="3429000" indent="-228600" algn="l" defTabSz="914400" rtl="0" eaLnBrk="1" latinLnBrk="0" hangingPunct="1">
+              <a:lnSpc>
+                <a:spcPct val="90000"/>
+              </a:lnSpc>
+              <a:spcBef>
+                <a:spcPts val="500"/>
+              </a:spcBef>
+              <a:buFont typeface="Arial" panose="020B0604020202020204" pitchFamily="34" charset="0"/>
+              <a:buChar char="•"/>
+              <a:defRPr sz="1800" kern="1200">
+                <a:solidFill>
+                  <a:schemeClr val="tx1"/>
+                </a:solidFill>
+                <a:latin typeface="+mn-lt"/>
+                <a:ea typeface="+mn-ea"/>
+                <a:cs typeface="+mn-cs"/>
+              </a:defRPr>
+            </a:lvl8pPr>
+            <a:lvl9pPr marL="3886200" indent="-228600" algn="l" defTabSz="914400" rtl="0" eaLnBrk="1" latinLnBrk="0" hangingPunct="1">
+              <a:lnSpc>
+                <a:spcPct val="90000"/>
+              </a:lnSpc>
+              <a:spcBef>
+                <a:spcPts val="500"/>
+              </a:spcBef>
+              <a:buFont typeface="Arial" panose="020B0604020202020204" pitchFamily="34" charset="0"/>
+              <a:buChar char="•"/>
+              <a:defRPr sz="1800" kern="1200">
+                <a:solidFill>
+                  <a:schemeClr val="tx1"/>
+                </a:solidFill>
+                <a:latin typeface="+mn-lt"/>
+                <a:ea typeface="+mn-ea"/>
+                <a:cs typeface="+mn-cs"/>
+              </a:defRPr>
+            </a:lvl9pPr>
+          </a:lstStyle>
+          <a:p>
+            <a:pPr marL="0" indent="0">
+              <a:buNone/>
+            </a:pPr>
+            <a:r>
+              <a:rPr lang="en-US" smtClean="0">
+                <a:latin typeface="Times New Roman" panose="02020603050405020304" pitchFamily="18" charset="0"/>
+                <a:cs typeface="Times New Roman" panose="02020603050405020304" pitchFamily="18" charset="0"/>
+              </a:rPr>
+              <a:t>{Variable}</a:t>
+            </a:r>
+            <a:r>
+              <a:rPr lang="en-US" baseline="-25000" smtClean="0">
+                <a:latin typeface="Times New Roman" panose="02020603050405020304" pitchFamily="18" charset="0"/>
+                <a:cs typeface="Times New Roman" panose="02020603050405020304" pitchFamily="18" charset="0"/>
+              </a:rPr>
+              <a:t>s</a:t>
+            </a:r>
+            <a:r>
+              <a:rPr lang="en-US" smtClean="0">
+                <a:latin typeface="Times New Roman" panose="02020603050405020304" pitchFamily="18" charset="0"/>
+                <a:cs typeface="Times New Roman" panose="02020603050405020304" pitchFamily="18" charset="0"/>
+              </a:rPr>
+              <a:t> </a:t>
+            </a:r>
+            <a:r>
+              <a:rPr lang="en-US" dirty="0" smtClean="0">
+                <a:latin typeface="Times New Roman" panose="02020603050405020304" pitchFamily="18" charset="0"/>
+                <a:cs typeface="Times New Roman" panose="02020603050405020304" pitchFamily="18" charset="0"/>
+              </a:rPr>
+              <a:t>= </a:t>
+            </a:r>
+            <a:r>
+              <a:rPr lang="en-US" dirty="0">
+                <a:latin typeface="Times New Roman" panose="02020603050405020304" pitchFamily="18" charset="0"/>
+                <a:cs typeface="Times New Roman" panose="02020603050405020304" pitchFamily="18" charset="0"/>
+              </a:rPr>
+              <a:t>n</a:t>
+            </a:r>
+            <a:r>
+              <a:rPr lang="en-US" dirty="0" smtClean="0">
+                <a:latin typeface="Times New Roman" panose="02020603050405020304" pitchFamily="18" charset="0"/>
+                <a:cs typeface="Times New Roman" panose="02020603050405020304" pitchFamily="18" charset="0"/>
+              </a:rPr>
+              <a:t>ot tested</a:t>
+            </a:r>
+          </a:p>
+          <a:p>
+            <a:r>
+              <a:rPr lang="en-US" dirty="0" smtClean="0">
+                <a:latin typeface="Times New Roman" panose="02020603050405020304" pitchFamily="18" charset="0"/>
+                <a:cs typeface="Times New Roman" panose="02020603050405020304" pitchFamily="18" charset="0"/>
+              </a:rPr>
+              <a:t>Q</a:t>
+            </a:r>
+            <a:r>
+              <a:rPr lang="en-US" baseline="-25000" dirty="0" smtClean="0">
+                <a:latin typeface="Times New Roman" panose="02020603050405020304" pitchFamily="18" charset="0"/>
+                <a:cs typeface="Times New Roman" panose="02020603050405020304" pitchFamily="18" charset="0"/>
+              </a:rPr>
+              <a:t>s</a:t>
+            </a:r>
+            <a:r>
+              <a:rPr lang="en-US" dirty="0" smtClean="0">
+                <a:latin typeface="Times New Roman" panose="02020603050405020304" pitchFamily="18" charset="0"/>
+                <a:cs typeface="Times New Roman" panose="02020603050405020304" pitchFamily="18" charset="0"/>
+              </a:rPr>
+              <a:t>=I: Infected not tested</a:t>
+            </a:r>
+          </a:p>
+          <a:p>
+            <a:r>
+              <a:rPr lang="en-US" dirty="0" err="1" smtClean="0">
+                <a:latin typeface="Times New Roman" panose="02020603050405020304" pitchFamily="18" charset="0"/>
+                <a:cs typeface="Times New Roman" panose="02020603050405020304" pitchFamily="18" charset="0"/>
+              </a:rPr>
+              <a:t>R</a:t>
+            </a:r>
+            <a:r>
+              <a:rPr lang="en-US" baseline="-25000" dirty="0" err="1" smtClean="0">
+                <a:latin typeface="Times New Roman" panose="02020603050405020304" pitchFamily="18" charset="0"/>
+                <a:cs typeface="Times New Roman" panose="02020603050405020304" pitchFamily="18" charset="0"/>
+              </a:rPr>
+              <a:t>s</a:t>
+            </a:r>
+            <a:r>
+              <a:rPr lang="en-US" dirty="0" smtClean="0">
+                <a:latin typeface="Times New Roman" panose="02020603050405020304" pitchFamily="18" charset="0"/>
+                <a:cs typeface="Times New Roman" panose="02020603050405020304" pitchFamily="18" charset="0"/>
+              </a:rPr>
+              <a:t>: Recovered not tested</a:t>
+            </a:r>
+          </a:p>
+          <a:p>
+            <a:r>
+              <a:rPr lang="en-US" dirty="0" smtClean="0">
+                <a:latin typeface="Times New Roman" panose="02020603050405020304" pitchFamily="18" charset="0"/>
+                <a:cs typeface="Times New Roman" panose="02020603050405020304" pitchFamily="18" charset="0"/>
+              </a:rPr>
+              <a:t>D</a:t>
+            </a:r>
+            <a:r>
+              <a:rPr lang="en-US" baseline="-25000" dirty="0" smtClean="0">
+                <a:latin typeface="Times New Roman" panose="02020603050405020304" pitchFamily="18" charset="0"/>
+                <a:cs typeface="Times New Roman" panose="02020603050405020304" pitchFamily="18" charset="0"/>
+              </a:rPr>
+              <a:t>s</a:t>
+            </a:r>
+            <a:r>
+              <a:rPr lang="en-US" dirty="0" smtClean="0">
+                <a:latin typeface="Times New Roman" panose="02020603050405020304" pitchFamily="18" charset="0"/>
+                <a:cs typeface="Times New Roman" panose="02020603050405020304" pitchFamily="18" charset="0"/>
+              </a:rPr>
+              <a:t>: Dead not tested</a:t>
+            </a:r>
+          </a:p>
+          <a:p>
+            <a:endParaRPr lang="en-US" dirty="0" smtClean="0">
+              <a:latin typeface="Times New Roman" panose="02020603050405020304" pitchFamily="18" charset="0"/>
+              <a:cs typeface="Times New Roman" panose="02020603050405020304" pitchFamily="18" charset="0"/>
+            </a:endParaRPr>
+          </a:p>
+          <a:p>
+            <a:endParaRPr lang="id-ID" dirty="0">
+              <a:latin typeface="Times New Roman" panose="02020603050405020304" pitchFamily="18" charset="0"/>
+              <a:cs typeface="Times New Roman" panose="02020603050405020304" pitchFamily="18" charset="0"/>
+            </a:endParaRPr>
+          </a:p>
+        </p:txBody>
+      </p:sp>
+      <mc:AlternateContent xmlns:mc="http://schemas.openxmlformats.org/markup-compatibility/2006" xmlns:a14="http://schemas.microsoft.com/office/drawing/2010/main">
+        <mc:Choice Requires="a14">
+          <p:sp>
+            <p:nvSpPr>
+              <p:cNvPr id="52" name="TextBox 51"/>
+              <p:cNvSpPr txBox="1"/>
+              <p:nvPr/>
+            </p:nvSpPr>
+            <p:spPr>
+              <a:xfrm>
+                <a:off x="1090607" y="5972557"/>
+                <a:ext cx="3526478" cy="430887"/>
+              </a:xfrm>
+              <a:prstGeom prst="rect">
+                <a:avLst/>
+              </a:prstGeom>
+              <a:noFill/>
+            </p:spPr>
+            <p:txBody>
+              <a:bodyPr wrap="none" lIns="0" tIns="0" rIns="0" bIns="0" rtlCol="0">
+                <a:spAutoFit/>
+              </a:bodyPr>
+              <a:lstStyle/>
+              <a:p>
+                <a:pPr/>
+                <a14:m>
+                  <m:oMathPara xmlns:m="http://schemas.openxmlformats.org/officeDocument/2006/math">
+                    <m:oMathParaPr>
+                      <m:jc m:val="centerGroup"/>
+                    </m:oMathParaPr>
+                    <m:oMath xmlns:m="http://schemas.openxmlformats.org/officeDocument/2006/math">
+                      <m:sSub>
+                        <m:sSubPr>
+                          <m:ctrlPr>
+                            <a:rPr lang="en-US" sz="2800" b="0" i="1" smtClean="0">
+                              <a:latin typeface="Cambria Math" panose="02040503050406030204" pitchFamily="18" charset="0"/>
+                            </a:rPr>
+                          </m:ctrlPr>
+                        </m:sSubPr>
+                        <m:e>
+                          <m:r>
+                            <a:rPr lang="en-US" sz="2800" b="0" i="1" smtClean="0">
+                              <a:latin typeface="Cambria Math" panose="02040503050406030204" pitchFamily="18" charset="0"/>
+                            </a:rPr>
+                            <m:t>𝑄</m:t>
+                          </m:r>
+                        </m:e>
+                        <m:sub>
+                          <m:r>
+                            <a:rPr lang="en-US" sz="2800" b="0" i="1" smtClean="0">
+                              <a:latin typeface="Cambria Math" panose="02040503050406030204" pitchFamily="18" charset="0"/>
+                            </a:rPr>
+                            <m:t>𝑠</m:t>
+                          </m:r>
+                        </m:sub>
+                      </m:sSub>
+                      <m:r>
+                        <a:rPr lang="en-US" sz="2800" b="0" i="1" smtClean="0">
+                          <a:latin typeface="Cambria Math" panose="02040503050406030204" pitchFamily="18" charset="0"/>
+                        </a:rPr>
+                        <m:t>=</m:t>
+                      </m:r>
+                      <m:r>
+                        <a:rPr lang="en-US" sz="2800" b="0" i="1" smtClean="0">
+                          <a:latin typeface="Cambria Math" panose="02040503050406030204" pitchFamily="18" charset="0"/>
+                        </a:rPr>
+                        <m:t>𝑓</m:t>
+                      </m:r>
+                      <m:d>
+                        <m:dPr>
+                          <m:ctrlPr>
+                            <a:rPr lang="en-US" sz="2800" b="0" i="1" smtClean="0">
+                              <a:latin typeface="Cambria Math" panose="02040503050406030204" pitchFamily="18" charset="0"/>
+                            </a:rPr>
+                          </m:ctrlPr>
+                        </m:dPr>
+                        <m:e>
+                          <m:r>
+                            <a:rPr lang="en-US" sz="2800" b="0" i="1" smtClean="0">
+                              <a:latin typeface="Cambria Math" panose="02040503050406030204" pitchFamily="18" charset="0"/>
+                            </a:rPr>
+                            <m:t>𝑄</m:t>
+                          </m:r>
+                        </m:e>
+                      </m:d>
+                      <m:r>
+                        <a:rPr lang="en-US" sz="2800" b="0" i="1" smtClean="0">
+                          <a:latin typeface="Cambria Math" panose="02040503050406030204" pitchFamily="18" charset="0"/>
+                        </a:rPr>
+                        <m:t> ~</m:t>
+                      </m:r>
+                      <m:r>
+                        <a:rPr lang="en-US" sz="2800" b="0" i="1" smtClean="0">
+                          <a:latin typeface="Cambria Math" panose="02040503050406030204" pitchFamily="18" charset="0"/>
+                        </a:rPr>
+                        <m:t>𝑁</m:t>
+                      </m:r>
+                      <m:d>
+                        <m:dPr>
+                          <m:ctrlPr>
+                            <a:rPr lang="en-US" sz="2800" b="0" i="1" smtClean="0">
+                              <a:latin typeface="Cambria Math" panose="02040503050406030204" pitchFamily="18" charset="0"/>
+                            </a:rPr>
+                          </m:ctrlPr>
+                        </m:dPr>
+                        <m:e>
+                          <m:r>
+                            <a:rPr lang="en-US" sz="2800" b="0" i="1" smtClean="0">
+                              <a:latin typeface="Cambria Math" panose="02040503050406030204" pitchFamily="18" charset="0"/>
+                            </a:rPr>
+                            <m:t>𝜇</m:t>
+                          </m:r>
+                          <m:r>
+                            <a:rPr lang="en-US" sz="2800" b="0" i="1" smtClean="0">
+                              <a:latin typeface="Cambria Math" panose="02040503050406030204" pitchFamily="18" charset="0"/>
+                            </a:rPr>
+                            <m:t>,</m:t>
+                          </m:r>
+                          <m:sSup>
+                            <m:sSupPr>
+                              <m:ctrlPr>
+                                <a:rPr lang="en-US" sz="2800" b="0" i="1" smtClean="0">
+                                  <a:latin typeface="Cambria Math" panose="02040503050406030204" pitchFamily="18" charset="0"/>
+                                </a:rPr>
+                              </m:ctrlPr>
+                            </m:sSupPr>
+                            <m:e>
+                              <m:r>
+                                <a:rPr lang="en-US" sz="2800" b="0" i="1" smtClean="0">
+                                  <a:latin typeface="Cambria Math" panose="02040503050406030204" pitchFamily="18" charset="0"/>
+                                </a:rPr>
+                                <m:t>𝜎</m:t>
+                              </m:r>
+                            </m:e>
+                            <m:sup>
+                              <m:r>
+                                <a:rPr lang="en-US" sz="2800" b="0" i="1" smtClean="0">
+                                  <a:latin typeface="Cambria Math" panose="02040503050406030204" pitchFamily="18" charset="0"/>
+                                </a:rPr>
+                                <m:t>2</m:t>
+                              </m:r>
+                            </m:sup>
+                          </m:sSup>
+                        </m:e>
+                      </m:d>
+                      <m:r>
+                        <a:rPr lang="en-US" sz="2800" b="0" i="1" smtClean="0">
+                          <a:latin typeface="Cambria Math" panose="02040503050406030204" pitchFamily="18" charset="0"/>
+                        </a:rPr>
+                        <m:t> </m:t>
+                      </m:r>
+                    </m:oMath>
+                  </m:oMathPara>
+                </a14:m>
+                <a:endParaRPr lang="id-ID" sz="2800" dirty="0"/>
+              </a:p>
+            </p:txBody>
+          </p:sp>
+        </mc:Choice>
+        <mc:Fallback xmlns="">
+          <p:sp>
+            <p:nvSpPr>
+              <p:cNvPr id="52" name="TextBox 51"/>
+              <p:cNvSpPr txBox="1">
+                <a:spLocks noRot="1" noChangeAspect="1" noMove="1" noResize="1" noEditPoints="1" noAdjustHandles="1" noChangeArrowheads="1" noChangeShapeType="1" noTextEdit="1"/>
+              </p:cNvSpPr>
+              <p:nvPr/>
+            </p:nvSpPr>
+            <p:spPr>
+              <a:xfrm>
+                <a:off x="1090607" y="5972557"/>
+                <a:ext cx="3526478" cy="430887"/>
+              </a:xfrm>
+              <a:prstGeom prst="rect">
+                <a:avLst/>
+              </a:prstGeom>
+              <a:blipFill rotWithShape="0">
+                <a:blip r:embed="rId8"/>
+                <a:stretch>
+                  <a:fillRect/>
+                </a:stretch>
+              </a:blipFill>
+            </p:spPr>
+            <p:txBody>
+              <a:bodyPr/>
+              <a:lstStyle/>
+              <a:p>
+                <a:r>
+                  <a:rPr lang="id-ID">
+                    <a:noFill/>
+                  </a:rPr>
+                  <a:t> </a:t>
+                </a:r>
+              </a:p>
+            </p:txBody>
+          </p:sp>
+        </mc:Fallback>
+      </mc:AlternateContent>
+      <p:sp>
+        <p:nvSpPr>
+          <p:cNvPr id="14" name="Rectangle 13"/>
+          <p:cNvSpPr/>
+          <p:nvPr/>
+        </p:nvSpPr>
+        <p:spPr>
+          <a:xfrm>
+            <a:off x="2448562" y="1276233"/>
+            <a:ext cx="2933624" cy="461665"/>
+          </a:xfrm>
+          <a:prstGeom prst="rect">
+            <a:avLst/>
+          </a:prstGeom>
+        </p:spPr>
+        <p:txBody>
+          <a:bodyPr wrap="none">
+            <a:spAutoFit/>
+          </a:bodyPr>
+          <a:lstStyle/>
+          <a:p>
+            <a:r>
+              <a:rPr lang="en-US" sz="2400" dirty="0" smtClean="0"/>
+              <a:t>Tested Compartments</a:t>
+            </a:r>
+            <a:endParaRPr lang="id-ID" sz="2400" dirty="0"/>
+          </a:p>
+        </p:txBody>
+      </p:sp>
+      <p:sp>
+        <p:nvSpPr>
+          <p:cNvPr id="53" name="Rectangle 52"/>
+          <p:cNvSpPr/>
+          <p:nvPr/>
+        </p:nvSpPr>
+        <p:spPr>
+          <a:xfrm>
+            <a:off x="2137876" y="4027530"/>
+            <a:ext cx="3117264" cy="461665"/>
+          </a:xfrm>
+          <a:prstGeom prst="rect">
+            <a:avLst/>
+          </a:prstGeom>
+        </p:spPr>
+        <p:txBody>
+          <a:bodyPr wrap="none">
+            <a:spAutoFit/>
+          </a:bodyPr>
+          <a:lstStyle/>
+          <a:p>
+            <a:r>
+              <a:rPr lang="en-US" sz="2400" dirty="0" smtClean="0"/>
+              <a:t>Shadow Compartments</a:t>
+            </a:r>
+            <a:endParaRPr lang="id-ID" sz="2400" dirty="0"/>
+          </a:p>
+        </p:txBody>
+      </p:sp>
+    </p:spTree>
+    <p:extLst>
+      <p:ext uri="{BB962C8B-B14F-4D97-AF65-F5344CB8AC3E}">
+        <p14:creationId xmlns:p14="http://schemas.microsoft.com/office/powerpoint/2010/main" val="1053507225"/>
+      </p:ext>
+    </p:extLst>
+  </p:cSld>
+  <p:clrMapOvr>
+    <a:masterClrMapping/>
+  </p:clrMapOvr>
+</p:sld>
+</file>
+
+<file path=ppt/slides/slide4.xml><?xml version="1.0" encoding="utf-8"?>
+<p:sld xmlns:a="http://schemas.openxmlformats.org/drawingml/2006/main" xmlns:r="http://schemas.openxmlformats.org/officeDocument/2006/relationships" xmlns:p="http://schemas.openxmlformats.org/presentationml/2006/main">
+  <p:cSld>
+    <p:spTree>
+      <p:nvGrpSpPr>
+        <p:cNvPr id="1" name=""/>
+        <p:cNvGrpSpPr/>
+        <p:nvPr/>
+      </p:nvGrpSpPr>
+      <p:grpSpPr>
+        <a:xfrm>
+          <a:off x="0" y="0"/>
+          <a:ext cx="0" cy="0"/>
+          <a:chOff x="0" y="0"/>
+          <a:chExt cx="0" cy="0"/>
+        </a:xfrm>
+      </p:grpSpPr>
+      <p:sp>
+        <p:nvSpPr>
+          <p:cNvPr id="17" name="Rounded Rectangle 16"/>
+          <p:cNvSpPr/>
+          <p:nvPr/>
+        </p:nvSpPr>
+        <p:spPr>
+          <a:xfrm>
+            <a:off x="610664" y="1276233"/>
+            <a:ext cx="6471139" cy="2848211"/>
+          </a:xfrm>
+          <a:prstGeom prst="roundRect">
+            <a:avLst/>
+          </a:prstGeom>
+          <a:noFill/>
+          <a:ln>
+            <a:prstDash val="dash"/>
+          </a:ln>
+        </p:spPr>
+        <p:style>
+          <a:lnRef idx="2">
+            <a:schemeClr val="accent1">
+              <a:shade val="50000"/>
+            </a:schemeClr>
+          </a:lnRef>
+          <a:fillRef idx="1">
+            <a:schemeClr val="accent1"/>
+          </a:fillRef>
+          <a:effectRef idx="0">
+            <a:schemeClr val="accent1"/>
+          </a:effectRef>
+          <a:fontRef idx="minor">
+            <a:schemeClr val="lt1"/>
+          </a:fontRef>
+        </p:style>
+        <p:txBody>
+          <a:bodyPr rtlCol="0" anchor="ctr"/>
+          <a:lstStyle/>
+          <a:p>
+            <a:pPr algn="ctr"/>
+            <a:endParaRPr lang="id-ID"/>
+          </a:p>
+        </p:txBody>
+      </p:sp>
+      <p:sp>
+        <p:nvSpPr>
+          <p:cNvPr id="56" name="Rounded Rectangle 55"/>
+          <p:cNvSpPr/>
+          <p:nvPr/>
+        </p:nvSpPr>
+        <p:spPr>
+          <a:xfrm>
+            <a:off x="610664" y="4110827"/>
+            <a:ext cx="6471139" cy="2480524"/>
+          </a:xfrm>
+          <a:prstGeom prst="roundRect">
+            <a:avLst/>
+          </a:prstGeom>
+          <a:noFill/>
+          <a:ln>
+            <a:prstDash val="dash"/>
+          </a:ln>
+        </p:spPr>
+        <p:style>
+          <a:lnRef idx="2">
+            <a:schemeClr val="accent1">
+              <a:shade val="50000"/>
+            </a:schemeClr>
+          </a:lnRef>
+          <a:fillRef idx="1">
+            <a:schemeClr val="accent1"/>
+          </a:fillRef>
+          <a:effectRef idx="0">
+            <a:schemeClr val="accent1"/>
+          </a:effectRef>
+          <a:fontRef idx="minor">
+            <a:schemeClr val="lt1"/>
+          </a:fontRef>
+        </p:style>
+        <p:txBody>
+          <a:bodyPr rtlCol="0" anchor="ctr"/>
+          <a:lstStyle/>
+          <a:p>
+            <a:pPr algn="ctr"/>
+            <a:endParaRPr lang="id-ID"/>
+          </a:p>
+        </p:txBody>
+      </p:sp>
+      <p:sp>
+        <p:nvSpPr>
+          <p:cNvPr id="2" name="Title 1"/>
+          <p:cNvSpPr>
+            <a:spLocks noGrp="1"/>
+          </p:cNvSpPr>
+          <p:nvPr>
+            <p:ph type="title"/>
+          </p:nvPr>
+        </p:nvSpPr>
+        <p:spPr>
+          <a:xfrm>
+            <a:off x="405224" y="245492"/>
+            <a:ext cx="11697831" cy="874566"/>
+          </a:xfrm>
+        </p:spPr>
+        <p:txBody>
+          <a:bodyPr/>
+          <a:lstStyle/>
+          <a:p>
+            <a:r>
+              <a:rPr lang="en-US" dirty="0" smtClean="0"/>
+              <a:t>Model </a:t>
+            </a:r>
+            <a:r>
+              <a:rPr lang="en-US" smtClean="0"/>
+              <a:t>SQRshadow</a:t>
             </a:r>
             <a:endParaRPr lang="id-ID" dirty="0"/>
           </a:p>
@@ -9152,7 +11142,7 @@
     </p:spTree>
     <p:extLst>
       <p:ext uri="{BB962C8B-B14F-4D97-AF65-F5344CB8AC3E}">
-        <p14:creationId xmlns:p14="http://schemas.microsoft.com/office/powerpoint/2010/main" val="1053507225"/>
+        <p14:creationId xmlns:p14="http://schemas.microsoft.com/office/powerpoint/2010/main" val="1102164705"/>
       </p:ext>
     </p:extLst>
   </p:cSld>
@@ -9162,7 +11152,7 @@
 </p:sld>
 </file>
 
-<file path=ppt/slides/slide4.xml><?xml version="1.0" encoding="utf-8"?>
+<file path=ppt/slides/slide5.xml><?xml version="1.0" encoding="utf-8"?>
 <p:sld xmlns:a="http://schemas.openxmlformats.org/drawingml/2006/main" xmlns:r="http://schemas.openxmlformats.org/officeDocument/2006/relationships" xmlns:p="http://schemas.openxmlformats.org/presentationml/2006/main">
   <p:cSld>
     <p:spTree>
@@ -11000,7 +12990,7 @@
 </p:sld>
 </file>
 
-<file path=ppt/slides/slide5.xml><?xml version="1.0" encoding="utf-8"?>
+<file path=ppt/slides/slide6.xml><?xml version="1.0" encoding="utf-8"?>
 <p:sld xmlns:a="http://schemas.openxmlformats.org/drawingml/2006/main" xmlns:r="http://schemas.openxmlformats.org/officeDocument/2006/relationships" xmlns:p="http://schemas.openxmlformats.org/presentationml/2006/main">
   <p:cSld>
     <p:spTree>
@@ -12737,7 +14727,7 @@
 </p:sld>
 </file>
 
-<file path=ppt/slides/slide6.xml><?xml version="1.0" encoding="utf-8"?>
+<file path=ppt/slides/slide7.xml><?xml version="1.0" encoding="utf-8"?>
 <p:sld xmlns:a="http://schemas.openxmlformats.org/drawingml/2006/main" xmlns:r="http://schemas.openxmlformats.org/officeDocument/2006/relationships" xmlns:p="http://schemas.openxmlformats.org/presentationml/2006/main">
   <p:cSld>
     <p:spTree>
@@ -14269,7 +16259,7 @@
 </p:sld>
 </file>
 
-<file path=ppt/slides/slide7.xml><?xml version="1.0" encoding="utf-8"?>
+<file path=ppt/slides/slide8.xml><?xml version="1.0" encoding="utf-8"?>
 <p:sld xmlns:a="http://schemas.openxmlformats.org/drawingml/2006/main" xmlns:r="http://schemas.openxmlformats.org/officeDocument/2006/relationships" xmlns:p="http://schemas.openxmlformats.org/presentationml/2006/main">
   <p:cSld>
     <p:spTree>
@@ -16490,7 +18480,7 @@
 </p:sld>
 </file>
 
-<file path=ppt/slides/slide8.xml><?xml version="1.0" encoding="utf-8"?>
+<file path=ppt/slides/slide9.xml><?xml version="1.0" encoding="utf-8"?>
 <p:sld xmlns:a="http://schemas.openxmlformats.org/drawingml/2006/main" xmlns:r="http://schemas.openxmlformats.org/officeDocument/2006/relationships" xmlns:p="http://schemas.openxmlformats.org/presentationml/2006/main">
   <p:cSld>
     <p:spTree>

</xml_diff>

<commit_message>
Fixed some line weights
</commit_message>
<xml_diff>
--- a/CobacobaModelIstilahBaru.pptx
+++ b/CobacobaModelIstilahBaru.pptx
@@ -3302,8 +3302,8 @@
           </a:p>
         </p:txBody>
       </p:sp>
-      <mc:AlternateContent xmlns:mc="http://schemas.openxmlformats.org/markup-compatibility/2006">
-        <mc:Choice xmlns:a14="http://schemas.microsoft.com/office/drawing/2010/main" Requires="a14">
+      <mc:AlternateContent xmlns:mc="http://schemas.openxmlformats.org/markup-compatibility/2006" xmlns:a14="http://schemas.microsoft.com/office/drawing/2010/main">
+        <mc:Choice Requires="a14">
           <p:sp>
             <p:nvSpPr>
               <p:cNvPr id="20" name="TextBox 19"/>
@@ -3347,7 +3347,7 @@
             </p:txBody>
           </p:sp>
         </mc:Choice>
-        <mc:Fallback>
+        <mc:Fallback xmlns="">
           <p:sp>
             <p:nvSpPr>
               <p:cNvPr id="20" name="TextBox 19"/>
@@ -3603,8 +3603,8 @@
           </a:fontRef>
         </p:style>
       </p:cxnSp>
-      <mc:AlternateContent xmlns:mc="http://schemas.openxmlformats.org/markup-compatibility/2006">
-        <mc:Choice xmlns:a14="http://schemas.microsoft.com/office/drawing/2010/main" Requires="a14">
+      <mc:AlternateContent xmlns:mc="http://schemas.openxmlformats.org/markup-compatibility/2006" xmlns:a14="http://schemas.microsoft.com/office/drawing/2010/main">
+        <mc:Choice Requires="a14">
           <p:sp>
             <p:nvSpPr>
               <p:cNvPr id="81" name="TextBox 80"/>
@@ -3667,7 +3667,7 @@
             </p:txBody>
           </p:sp>
         </mc:Choice>
-        <mc:Fallback>
+        <mc:Fallback xmlns="">
           <p:sp>
             <p:nvSpPr>
               <p:cNvPr id="81" name="TextBox 80"/>
@@ -3706,8 +3706,8 @@
           </p:sp>
         </mc:Fallback>
       </mc:AlternateContent>
-      <mc:AlternateContent xmlns:mc="http://schemas.openxmlformats.org/markup-compatibility/2006">
-        <mc:Choice xmlns:a14="http://schemas.microsoft.com/office/drawing/2010/main" Requires="a14">
+      <mc:AlternateContent xmlns:mc="http://schemas.openxmlformats.org/markup-compatibility/2006" xmlns:a14="http://schemas.microsoft.com/office/drawing/2010/main">
+        <mc:Choice Requires="a14">
           <p:sp>
             <p:nvSpPr>
               <p:cNvPr id="83" name="TextBox 82"/>
@@ -3751,7 +3751,7 @@
             </p:txBody>
           </p:sp>
         </mc:Choice>
-        <mc:Fallback>
+        <mc:Fallback xmlns="">
           <p:sp>
             <p:nvSpPr>
               <p:cNvPr id="83" name="TextBox 82"/>
@@ -3790,8 +3790,8 @@
           </p:sp>
         </mc:Fallback>
       </mc:AlternateContent>
-      <mc:AlternateContent xmlns:mc="http://schemas.openxmlformats.org/markup-compatibility/2006">
-        <mc:Choice xmlns:a14="http://schemas.microsoft.com/office/drawing/2010/main" Requires="a14">
+      <mc:AlternateContent xmlns:mc="http://schemas.openxmlformats.org/markup-compatibility/2006" xmlns:a14="http://schemas.microsoft.com/office/drawing/2010/main">
+        <mc:Choice Requires="a14">
           <p:sp>
             <p:nvSpPr>
               <p:cNvPr id="89" name="TextBox 88"/>
@@ -3866,7 +3866,7 @@
             </p:txBody>
           </p:sp>
         </mc:Choice>
-        <mc:Fallback>
+        <mc:Fallback xmlns="">
           <p:sp>
             <p:nvSpPr>
               <p:cNvPr id="89" name="TextBox 88"/>
@@ -11155,11 +11155,7 @@
           <a:p>
             <a:r>
               <a:rPr lang="en-US" dirty="0" smtClean="0"/>
-              <a:t>Model </a:t>
-            </a:r>
-            <a:r>
-              <a:rPr lang="en-US" dirty="0" smtClean="0"/>
-              <a:t>SIRQN</a:t>
+              <a:t>Model SIRQN</a:t>
             </a:r>
             <a:endParaRPr lang="id-ID" dirty="0"/>
           </a:p>
@@ -11210,34 +11206,32 @@
                 <a:latin typeface="Times New Roman" panose="02020603050405020304" pitchFamily="18" charset="0"/>
                 <a:cs typeface="Times New Roman" panose="02020603050405020304" pitchFamily="18" charset="0"/>
               </a:rPr>
-              <a:t>ND: Non-positive </a:t>
+              <a:t>ND: Non-positive Deaths</a:t>
+            </a:r>
+          </a:p>
+          <a:p>
+            <a:r>
+              <a:rPr lang="en-US" dirty="0">
+                <a:latin typeface="Times New Roman" panose="02020603050405020304" pitchFamily="18" charset="0"/>
+                <a:cs typeface="Times New Roman" panose="02020603050405020304" pitchFamily="18" charset="0"/>
+              </a:rPr>
+              <a:t>I</a:t>
             </a:r>
             <a:r>
               <a:rPr lang="en-US" dirty="0" smtClean="0">
                 <a:latin typeface="Times New Roman" panose="02020603050405020304" pitchFamily="18" charset="0"/>
                 <a:cs typeface="Times New Roman" panose="02020603050405020304" pitchFamily="18" charset="0"/>
               </a:rPr>
-              <a:t>Deaths</a:t>
-            </a:r>
-            <a:endParaRPr lang="en-US" dirty="0" smtClean="0">
-              <a:latin typeface="Times New Roman" panose="02020603050405020304" pitchFamily="18" charset="0"/>
-              <a:cs typeface="Times New Roman" panose="02020603050405020304" pitchFamily="18" charset="0"/>
-            </a:endParaRPr>
-          </a:p>
-          <a:p>
-            <a:r>
-              <a:rPr lang="en-US" dirty="0">
-                <a:latin typeface="Times New Roman" panose="02020603050405020304" pitchFamily="18" charset="0"/>
-                <a:cs typeface="Times New Roman" panose="02020603050405020304" pitchFamily="18" charset="0"/>
-              </a:rPr>
-              <a:t>I</a:t>
-            </a:r>
+              <a:t>: Infectious</a:t>
+            </a:r>
+          </a:p>
+          <a:p>
             <a:r>
               <a:rPr lang="en-US" dirty="0" smtClean="0">
                 <a:latin typeface="Times New Roman" panose="02020603050405020304" pitchFamily="18" charset="0"/>
                 <a:cs typeface="Times New Roman" panose="02020603050405020304" pitchFamily="18" charset="0"/>
               </a:rPr>
-              <a:t>: Infectious</a:t>
+              <a:t>Q: Quarantined</a:t>
             </a:r>
           </a:p>
           <a:p>
@@ -11246,7 +11240,7 @@
                 <a:latin typeface="Times New Roman" panose="02020603050405020304" pitchFamily="18" charset="0"/>
                 <a:cs typeface="Times New Roman" panose="02020603050405020304" pitchFamily="18" charset="0"/>
               </a:rPr>
-              <a:t>Q: Quarantined</a:t>
+              <a:t>R: Recovered</a:t>
             </a:r>
           </a:p>
           <a:p>
@@ -11255,15 +11249,6 @@
                 <a:latin typeface="Times New Roman" panose="02020603050405020304" pitchFamily="18" charset="0"/>
                 <a:cs typeface="Times New Roman" panose="02020603050405020304" pitchFamily="18" charset="0"/>
               </a:rPr>
-              <a:t>R: Recovered</a:t>
-            </a:r>
-          </a:p>
-          <a:p>
-            <a:r>
-              <a:rPr lang="en-US" dirty="0" smtClean="0">
-                <a:latin typeface="Times New Roman" panose="02020603050405020304" pitchFamily="18" charset="0"/>
-                <a:cs typeface="Times New Roman" panose="02020603050405020304" pitchFamily="18" charset="0"/>
-              </a:rPr>
               <a:t>D</a:t>
             </a:r>
             <a:r>
@@ -11271,14 +11256,7 @@
                 <a:latin typeface="Times New Roman" panose="02020603050405020304" pitchFamily="18" charset="0"/>
                 <a:cs typeface="Times New Roman" panose="02020603050405020304" pitchFamily="18" charset="0"/>
               </a:rPr>
-              <a:t>: </a:t>
-            </a:r>
-            <a:r>
-              <a:rPr lang="en-US" smtClean="0">
-                <a:latin typeface="Times New Roman" panose="02020603050405020304" pitchFamily="18" charset="0"/>
-                <a:cs typeface="Times New Roman" panose="02020603050405020304" pitchFamily="18" charset="0"/>
-              </a:rPr>
-              <a:t>Deaths</a:t>
+              <a:t>: Deaths</a:t>
             </a:r>
             <a:endParaRPr lang="id-ID" dirty="0">
               <a:latin typeface="Times New Roman" panose="02020603050405020304" pitchFamily="18" charset="0"/>
@@ -11287,8 +11265,8 @@
           </a:p>
         </p:txBody>
       </p:sp>
-      <mc:AlternateContent xmlns:mc="http://schemas.openxmlformats.org/markup-compatibility/2006">
-        <mc:Choice xmlns:a14="http://schemas.microsoft.com/office/drawing/2010/main" Requires="a14">
+      <mc:AlternateContent xmlns:mc="http://schemas.openxmlformats.org/markup-compatibility/2006" xmlns:a14="http://schemas.microsoft.com/office/drawing/2010/main">
+        <mc:Choice Requires="a14">
           <p:sp>
             <p:nvSpPr>
               <p:cNvPr id="20" name="TextBox 19"/>
@@ -11332,7 +11310,7 @@
             </p:txBody>
           </p:sp>
         </mc:Choice>
-        <mc:Fallback>
+        <mc:Fallback xmlns="">
           <p:sp>
             <p:nvSpPr>
               <p:cNvPr id="20" name="TextBox 19"/>
@@ -11371,8 +11349,8 @@
           </p:sp>
         </mc:Fallback>
       </mc:AlternateContent>
-      <mc:AlternateContent xmlns:mc="http://schemas.openxmlformats.org/markup-compatibility/2006">
-        <mc:Choice xmlns:a14="http://schemas.microsoft.com/office/drawing/2010/main" Requires="a14">
+      <mc:AlternateContent xmlns:mc="http://schemas.openxmlformats.org/markup-compatibility/2006" xmlns:a14="http://schemas.microsoft.com/office/drawing/2010/main">
+        <mc:Choice Requires="a14">
           <p:sp>
             <p:nvSpPr>
               <p:cNvPr id="24" name="TextBox 23"/>
@@ -11447,7 +11425,7 @@
             </p:txBody>
           </p:sp>
         </mc:Choice>
-        <mc:Fallback>
+        <mc:Fallback xmlns="">
           <p:sp>
             <p:nvSpPr>
               <p:cNvPr id="24" name="TextBox 23"/>
@@ -11486,8 +11464,8 @@
           </p:sp>
         </mc:Fallback>
       </mc:AlternateContent>
-      <mc:AlternateContent xmlns:mc="http://schemas.openxmlformats.org/markup-compatibility/2006">
-        <mc:Choice xmlns:a14="http://schemas.microsoft.com/office/drawing/2010/main" Requires="a14">
+      <mc:AlternateContent xmlns:mc="http://schemas.openxmlformats.org/markup-compatibility/2006" xmlns:a14="http://schemas.microsoft.com/office/drawing/2010/main">
+        <mc:Choice Requires="a14">
           <p:sp>
             <p:nvSpPr>
               <p:cNvPr id="27" name="TextBox 26"/>
@@ -11562,7 +11540,7 @@
             </p:txBody>
           </p:sp>
         </mc:Choice>
-        <mc:Fallback>
+        <mc:Fallback xmlns="">
           <p:sp>
             <p:nvSpPr>
               <p:cNvPr id="27" name="TextBox 26"/>
@@ -11604,13 +11582,15 @@
       <p:cxnSp>
         <p:nvCxnSpPr>
           <p:cNvPr id="48" name="Straight Arrow Connector 47"/>
-          <p:cNvCxnSpPr/>
+          <p:cNvCxnSpPr>
+            <a:endCxn id="50" idx="1"/>
+          </p:cNvCxnSpPr>
           <p:nvPr/>
         </p:nvCxnSpPr>
         <p:spPr>
           <a:xfrm>
             <a:off x="4228024" y="5598153"/>
-            <a:ext cx="1496560" cy="4798"/>
+            <a:ext cx="1437804" cy="6821"/>
           </a:xfrm>
           <a:prstGeom prst="straightConnector1">
             <a:avLst/>
@@ -11693,7 +11673,7 @@
           <a:prstGeom prst="straightConnector1">
             <a:avLst/>
           </a:prstGeom>
-          <a:ln w="76200">
+          <a:ln w="57150">
             <a:solidFill>
               <a:schemeClr val="tx1"/>
             </a:solidFill>
@@ -11832,8 +11812,8 @@
           </a:fontRef>
         </p:style>
       </p:cxnSp>
-      <mc:AlternateContent xmlns:mc="http://schemas.openxmlformats.org/markup-compatibility/2006">
-        <mc:Choice xmlns:a14="http://schemas.microsoft.com/office/drawing/2010/main" Requires="a14">
+      <mc:AlternateContent xmlns:mc="http://schemas.openxmlformats.org/markup-compatibility/2006" xmlns:a14="http://schemas.microsoft.com/office/drawing/2010/main">
+        <mc:Choice Requires="a14">
           <p:sp>
             <p:nvSpPr>
               <p:cNvPr id="81" name="TextBox 80"/>
@@ -11896,7 +11876,7 @@
             </p:txBody>
           </p:sp>
         </mc:Choice>
-        <mc:Fallback>
+        <mc:Fallback xmlns="">
           <p:sp>
             <p:nvSpPr>
               <p:cNvPr id="81" name="TextBox 80"/>
@@ -11935,8 +11915,8 @@
           </p:sp>
         </mc:Fallback>
       </mc:AlternateContent>
-      <mc:AlternateContent xmlns:mc="http://schemas.openxmlformats.org/markup-compatibility/2006">
-        <mc:Choice xmlns:a14="http://schemas.microsoft.com/office/drawing/2010/main" Requires="a14">
+      <mc:AlternateContent xmlns:mc="http://schemas.openxmlformats.org/markup-compatibility/2006" xmlns:a14="http://schemas.microsoft.com/office/drawing/2010/main">
+        <mc:Choice Requires="a14">
           <p:sp>
             <p:nvSpPr>
               <p:cNvPr id="82" name="TextBox 81"/>
@@ -12011,7 +11991,7 @@
             </p:txBody>
           </p:sp>
         </mc:Choice>
-        <mc:Fallback>
+        <mc:Fallback xmlns="">
           <p:sp>
             <p:nvSpPr>
               <p:cNvPr id="82" name="TextBox 81"/>
@@ -12050,8 +12030,8 @@
           </p:sp>
         </mc:Fallback>
       </mc:AlternateContent>
-      <mc:AlternateContent xmlns:mc="http://schemas.openxmlformats.org/markup-compatibility/2006">
-        <mc:Choice xmlns:a14="http://schemas.microsoft.com/office/drawing/2010/main" Requires="a14">
+      <mc:AlternateContent xmlns:mc="http://schemas.openxmlformats.org/markup-compatibility/2006" xmlns:a14="http://schemas.microsoft.com/office/drawing/2010/main">
+        <mc:Choice Requires="a14">
           <p:sp>
             <p:nvSpPr>
               <p:cNvPr id="83" name="TextBox 82"/>
@@ -12095,7 +12075,7 @@
             </p:txBody>
           </p:sp>
         </mc:Choice>
-        <mc:Fallback>
+        <mc:Fallback xmlns="">
           <p:sp>
             <p:nvSpPr>
               <p:cNvPr id="83" name="TextBox 82"/>
@@ -12134,8 +12114,8 @@
           </p:sp>
         </mc:Fallback>
       </mc:AlternateContent>
-      <mc:AlternateContent xmlns:mc="http://schemas.openxmlformats.org/markup-compatibility/2006">
-        <mc:Choice xmlns:a14="http://schemas.microsoft.com/office/drawing/2010/main" Requires="a14">
+      <mc:AlternateContent xmlns:mc="http://schemas.openxmlformats.org/markup-compatibility/2006" xmlns:a14="http://schemas.microsoft.com/office/drawing/2010/main">
+        <mc:Choice Requires="a14">
           <p:sp>
             <p:nvSpPr>
               <p:cNvPr id="89" name="TextBox 88"/>
@@ -12210,7 +12190,7 @@
             </p:txBody>
           </p:sp>
         </mc:Choice>
-        <mc:Fallback>
+        <mc:Fallback xmlns="">
           <p:sp>
             <p:nvSpPr>
               <p:cNvPr id="89" name="TextBox 88"/>
@@ -12287,8 +12267,8 @@
           </a:fontRef>
         </p:style>
       </p:cxnSp>
-      <mc:AlternateContent xmlns:mc="http://schemas.openxmlformats.org/markup-compatibility/2006">
-        <mc:Choice xmlns:a14="http://schemas.microsoft.com/office/drawing/2010/main" Requires="a14">
+      <mc:AlternateContent xmlns:mc="http://schemas.openxmlformats.org/markup-compatibility/2006" xmlns:a14="http://schemas.microsoft.com/office/drawing/2010/main">
+        <mc:Choice Requires="a14">
           <p:sp>
             <p:nvSpPr>
               <p:cNvPr id="38" name="TextBox 37"/>
@@ -12363,7 +12343,7 @@
             </p:txBody>
           </p:sp>
         </mc:Choice>
-        <mc:Fallback>
+        <mc:Fallback xmlns="">
           <p:sp>
             <p:nvSpPr>
               <p:cNvPr id="38" name="TextBox 37"/>
@@ -12880,11 +12860,7 @@
           <a:p>
             <a:r>
               <a:rPr lang="en-US" dirty="0" smtClean="0"/>
-              <a:t>Model </a:t>
-            </a:r>
-            <a:r>
-              <a:rPr lang="en-US" dirty="0" smtClean="0"/>
-              <a:t>SIRQN with NR</a:t>
+              <a:t>Model SIRQN with NR</a:t>
             </a:r>
             <a:endParaRPr lang="id-ID" dirty="0"/>
           </a:p>

</xml_diff>